<commit_message>
Fix formatting in footer.html by adding a trailing newline before the next div element
</commit_message>
<xml_diff>
--- a/word CSN/XÂY DỰNG WEBSITE GIỚI THIỆU DI TÍCH TRÊN.pptx
+++ b/word CSN/XÂY DỰNG WEBSITE GIỚI THIỆU DI TÍCH TRÊN.pptx
@@ -5,16 +5,18 @@
     <p:sldMasterId id="2147483648" r:id="rId1"/>
   </p:sldMasterIdLst>
   <p:sldIdLst>
-    <p:sldId id="256" r:id="rId2"/>
-    <p:sldId id="257" r:id="rId3"/>
-    <p:sldId id="258" r:id="rId4"/>
-    <p:sldId id="259" r:id="rId5"/>
-    <p:sldId id="260" r:id="rId6"/>
-    <p:sldId id="261" r:id="rId7"/>
-    <p:sldId id="262" r:id="rId8"/>
-    <p:sldId id="263" r:id="rId9"/>
-    <p:sldId id="264" r:id="rId10"/>
-    <p:sldId id="265" r:id="rId11"/>
+    <p:sldId id="266" r:id="rId2"/>
+    <p:sldId id="256" r:id="rId3"/>
+    <p:sldId id="257" r:id="rId4"/>
+    <p:sldId id="258" r:id="rId5"/>
+    <p:sldId id="259" r:id="rId6"/>
+    <p:sldId id="260" r:id="rId7"/>
+    <p:sldId id="261" r:id="rId8"/>
+    <p:sldId id="262" r:id="rId9"/>
+    <p:sldId id="263" r:id="rId10"/>
+    <p:sldId id="264" r:id="rId11"/>
+    <p:sldId id="265" r:id="rId12"/>
+    <p:sldId id="267" r:id="rId13"/>
   </p:sldIdLst>
   <p:sldSz cx="12192000" cy="6858000"/>
   <p:notesSz cx="6858000" cy="9144000"/>
@@ -268,7 +270,7 @@
           <a:p>
             <a:fld id="{EBF4768F-B4DA-4653-82E4-44A9E1973340}" type="datetimeFigureOut">
               <a:rPr lang="en-US" smtClean="0"/>
-              <a:t>1/7/2025</a:t>
+              <a:t>1/13/2025</a:t>
             </a:fld>
             <a:endParaRPr lang="en-US"/>
           </a:p>
@@ -466,7 +468,7 @@
           <a:p>
             <a:fld id="{EBF4768F-B4DA-4653-82E4-44A9E1973340}" type="datetimeFigureOut">
               <a:rPr lang="en-US" smtClean="0"/>
-              <a:t>1/7/2025</a:t>
+              <a:t>1/13/2025</a:t>
             </a:fld>
             <a:endParaRPr lang="en-US"/>
           </a:p>
@@ -674,7 +676,7 @@
           <a:p>
             <a:fld id="{EBF4768F-B4DA-4653-82E4-44A9E1973340}" type="datetimeFigureOut">
               <a:rPr lang="en-US" smtClean="0"/>
-              <a:t>1/7/2025</a:t>
+              <a:t>1/13/2025</a:t>
             </a:fld>
             <a:endParaRPr lang="en-US"/>
           </a:p>
@@ -872,7 +874,7 @@
           <a:p>
             <a:fld id="{EBF4768F-B4DA-4653-82E4-44A9E1973340}" type="datetimeFigureOut">
               <a:rPr lang="en-US" smtClean="0"/>
-              <a:t>1/7/2025</a:t>
+              <a:t>1/13/2025</a:t>
             </a:fld>
             <a:endParaRPr lang="en-US"/>
           </a:p>
@@ -1147,7 +1149,7 @@
           <a:p>
             <a:fld id="{EBF4768F-B4DA-4653-82E4-44A9E1973340}" type="datetimeFigureOut">
               <a:rPr lang="en-US" smtClean="0"/>
-              <a:t>1/7/2025</a:t>
+              <a:t>1/13/2025</a:t>
             </a:fld>
             <a:endParaRPr lang="en-US"/>
           </a:p>
@@ -1412,7 +1414,7 @@
           <a:p>
             <a:fld id="{EBF4768F-B4DA-4653-82E4-44A9E1973340}" type="datetimeFigureOut">
               <a:rPr lang="en-US" smtClean="0"/>
-              <a:t>1/7/2025</a:t>
+              <a:t>1/13/2025</a:t>
             </a:fld>
             <a:endParaRPr lang="en-US"/>
           </a:p>
@@ -1824,7 +1826,7 @@
           <a:p>
             <a:fld id="{EBF4768F-B4DA-4653-82E4-44A9E1973340}" type="datetimeFigureOut">
               <a:rPr lang="en-US" smtClean="0"/>
-              <a:t>1/7/2025</a:t>
+              <a:t>1/13/2025</a:t>
             </a:fld>
             <a:endParaRPr lang="en-US"/>
           </a:p>
@@ -1965,7 +1967,7 @@
           <a:p>
             <a:fld id="{EBF4768F-B4DA-4653-82E4-44A9E1973340}" type="datetimeFigureOut">
               <a:rPr lang="en-US" smtClean="0"/>
-              <a:t>1/7/2025</a:t>
+              <a:t>1/13/2025</a:t>
             </a:fld>
             <a:endParaRPr lang="en-US"/>
           </a:p>
@@ -2078,7 +2080,7 @@
           <a:p>
             <a:fld id="{EBF4768F-B4DA-4653-82E4-44A9E1973340}" type="datetimeFigureOut">
               <a:rPr lang="en-US" smtClean="0"/>
-              <a:t>1/7/2025</a:t>
+              <a:t>1/13/2025</a:t>
             </a:fld>
             <a:endParaRPr lang="en-US"/>
           </a:p>
@@ -2389,7 +2391,7 @@
           <a:p>
             <a:fld id="{EBF4768F-B4DA-4653-82E4-44A9E1973340}" type="datetimeFigureOut">
               <a:rPr lang="en-US" smtClean="0"/>
-              <a:t>1/7/2025</a:t>
+              <a:t>1/13/2025</a:t>
             </a:fld>
             <a:endParaRPr lang="en-US"/>
           </a:p>
@@ -2677,7 +2679,7 @@
           <a:p>
             <a:fld id="{EBF4768F-B4DA-4653-82E4-44A9E1973340}" type="datetimeFigureOut">
               <a:rPr lang="en-US" smtClean="0"/>
-              <a:t>1/7/2025</a:t>
+              <a:t>1/13/2025</a:t>
             </a:fld>
             <a:endParaRPr lang="en-US"/>
           </a:p>
@@ -2918,7 +2920,7 @@
           <a:p>
             <a:fld id="{EBF4768F-B4DA-4653-82E4-44A9E1973340}" type="datetimeFigureOut">
               <a:rPr lang="en-US" smtClean="0"/>
-              <a:t>1/7/2025</a:t>
+              <a:t>1/13/2025</a:t>
             </a:fld>
             <a:endParaRPr lang="en-US"/>
           </a:p>
@@ -3340,6 +3342,1353 @@
           <p:cNvPr id="2" name="Title 1">
             <a:extLst>
               <a:ext uri="{FF2B5EF4-FFF2-40B4-BE49-F238E27FC236}">
+                <a16:creationId xmlns:a16="http://schemas.microsoft.com/office/drawing/2014/main" id="{1CDBF963-F89C-4868-381A-BEFF1845D681}"/>
+              </a:ext>
+            </a:extLst>
+          </p:cNvPr>
+          <p:cNvSpPr>
+            <a:spLocks noGrp="1"/>
+          </p:cNvSpPr>
+          <p:nvPr>
+            <p:ph type="title"/>
+          </p:nvPr>
+        </p:nvSpPr>
+        <p:spPr>
+          <a:xfrm>
+            <a:off x="3342968" y="550607"/>
+            <a:ext cx="7334864" cy="1651818"/>
+          </a:xfrm>
+        </p:spPr>
+        <p:txBody>
+          <a:bodyPr>
+            <a:normAutofit/>
+          </a:bodyPr>
+          <a:lstStyle/>
+          <a:p>
+            <a:pPr algn="ctr"/>
+            <a:r>
+              <a:rPr lang="vi-VN" sz="3600" dirty="0">
+                <a:solidFill>
+                  <a:schemeClr val="tx2">
+                    <a:lumMod val="75000"/>
+                    <a:lumOff val="25000"/>
+                  </a:schemeClr>
+                </a:solidFill>
+              </a:rPr>
+              <a:t>   </a:t>
+            </a:r>
+            <a:r>
+              <a:rPr lang="vi-VN" sz="3200" dirty="0">
+                <a:solidFill>
+                  <a:schemeClr val="tx2">
+                    <a:lumMod val="50000"/>
+                    <a:lumOff val="50000"/>
+                  </a:schemeClr>
+                </a:solidFill>
+              </a:rPr>
+              <a:t>TRƯỜNG ĐẠI HỌC TRÀ VINH</a:t>
+            </a:r>
+            <a:br>
+              <a:rPr lang="vi-VN" sz="3600" dirty="0">
+                <a:solidFill>
+                  <a:schemeClr val="tx2">
+                    <a:lumMod val="75000"/>
+                    <a:lumOff val="25000"/>
+                  </a:schemeClr>
+                </a:solidFill>
+              </a:rPr>
+            </a:br>
+            <a:r>
+              <a:rPr lang="vi-VN" sz="3600" dirty="0">
+                <a:solidFill>
+                  <a:schemeClr val="tx2">
+                    <a:lumMod val="75000"/>
+                    <a:lumOff val="25000"/>
+                  </a:schemeClr>
+                </a:solidFill>
+              </a:rPr>
+              <a:t>    </a:t>
+            </a:r>
+            <a:r>
+              <a:rPr lang="vi-VN" sz="3200" dirty="0">
+                <a:solidFill>
+                  <a:schemeClr val="tx2">
+                    <a:lumMod val="75000"/>
+                    <a:lumOff val="25000"/>
+                  </a:schemeClr>
+                </a:solidFill>
+              </a:rPr>
+              <a:t>KHOA KĨ THUẬT VÀ CÔNG NGHỆ</a:t>
+            </a:r>
+            <a:br>
+              <a:rPr lang="en-US" sz="3600" dirty="0">
+                <a:solidFill>
+                  <a:schemeClr val="tx2">
+                    <a:lumMod val="75000"/>
+                    <a:lumOff val="25000"/>
+                  </a:schemeClr>
+                </a:solidFill>
+              </a:rPr>
+            </a:br>
+            <a:endParaRPr lang="en-US" sz="3600" dirty="0"/>
+          </a:p>
+        </p:txBody>
+      </p:sp>
+      <p:pic>
+        <p:nvPicPr>
+          <p:cNvPr id="7" name="Content Placeholder 6" descr="A blue and white logo&#10;&#10;Description automatically generated">
+            <a:extLst>
+              <a:ext uri="{FF2B5EF4-FFF2-40B4-BE49-F238E27FC236}">
+                <a16:creationId xmlns:a16="http://schemas.microsoft.com/office/drawing/2014/main" id="{62128EA4-A0C7-2579-11BB-03C69570EAC7}"/>
+              </a:ext>
+            </a:extLst>
+          </p:cNvPr>
+          <p:cNvPicPr>
+            <a:picLocks noGrp="1" noChangeAspect="1"/>
+          </p:cNvPicPr>
+          <p:nvPr>
+            <p:ph idx="1"/>
+          </p:nvPr>
+        </p:nvPicPr>
+        <p:blipFill>
+          <a:blip r:embed="rId2">
+            <a:extLst>
+              <a:ext uri="{28A0092B-C50C-407E-A947-70E740481C1C}">
+                <a14:useLocalDpi xmlns:a14="http://schemas.microsoft.com/office/drawing/2010/main" val="0"/>
+              </a:ext>
+            </a:extLst>
+          </a:blip>
+          <a:stretch>
+            <a:fillRect/>
+          </a:stretch>
+        </p:blipFill>
+        <p:spPr>
+          <a:xfrm>
+            <a:off x="1002888" y="530942"/>
+            <a:ext cx="1548581" cy="1325563"/>
+          </a:xfrm>
+        </p:spPr>
+      </p:pic>
+      <p:sp>
+        <p:nvSpPr>
+          <p:cNvPr id="5" name="Rectangle 4">
+            <a:extLst>
+              <a:ext uri="{FF2B5EF4-FFF2-40B4-BE49-F238E27FC236}">
+                <a16:creationId xmlns:a16="http://schemas.microsoft.com/office/drawing/2014/main" id="{CF02F0A3-53FE-B299-9E43-6C7F5944F15B}"/>
+              </a:ext>
+            </a:extLst>
+          </p:cNvPr>
+          <p:cNvSpPr/>
+          <p:nvPr/>
+        </p:nvSpPr>
+        <p:spPr>
+          <a:xfrm>
+            <a:off x="838200" y="365125"/>
+            <a:ext cx="10515600" cy="5811838"/>
+          </a:xfrm>
+          <a:prstGeom prst="rect">
+            <a:avLst/>
+          </a:prstGeom>
+          <a:noFill/>
+          <a:ln w="190500"/>
+        </p:spPr>
+        <p:style>
+          <a:lnRef idx="2">
+            <a:schemeClr val="accent1">
+              <a:shade val="15000"/>
+            </a:schemeClr>
+          </a:lnRef>
+          <a:fillRef idx="1">
+            <a:schemeClr val="accent1"/>
+          </a:fillRef>
+          <a:effectRef idx="0">
+            <a:schemeClr val="accent1"/>
+          </a:effectRef>
+          <a:fontRef idx="minor">
+            <a:schemeClr val="lt1"/>
+          </a:fontRef>
+        </p:style>
+        <p:txBody>
+          <a:bodyPr rtlCol="0" anchor="ctr"/>
+          <a:lstStyle/>
+          <a:p>
+            <a:pPr algn="ctr"/>
+            <a:endParaRPr lang="en-US" dirty="0"/>
+          </a:p>
+        </p:txBody>
+      </p:sp>
+      <p:graphicFrame>
+        <p:nvGraphicFramePr>
+          <p:cNvPr id="10" name="Table 9">
+            <a:extLst>
+              <a:ext uri="{FF2B5EF4-FFF2-40B4-BE49-F238E27FC236}">
+                <a16:creationId xmlns:a16="http://schemas.microsoft.com/office/drawing/2014/main" id="{E5A02C3D-4C4B-77DE-B08A-FDD3FED12918}"/>
+              </a:ext>
+            </a:extLst>
+          </p:cNvPr>
+          <p:cNvGraphicFramePr>
+            <a:graphicFrameLocks noGrp="1"/>
+          </p:cNvGraphicFramePr>
+          <p:nvPr>
+            <p:extLst>
+              <p:ext uri="{D42A27DB-BD31-4B8C-83A1-F6EECF244321}">
+                <p14:modId xmlns:p14="http://schemas.microsoft.com/office/powerpoint/2010/main" val="3617962521"/>
+              </p:ext>
+            </p:extLst>
+          </p:nvPr>
+        </p:nvGraphicFramePr>
+        <p:xfrm>
+          <a:off x="3342968" y="1946787"/>
+          <a:ext cx="7334864" cy="737419"/>
+        </p:xfrm>
+        <a:graphic>
+          <a:graphicData uri="http://schemas.openxmlformats.org/drawingml/2006/table">
+            <a:tbl>
+              <a:tblPr firstRow="1" bandRow="1">
+                <a:tableStyleId>{5C22544A-7EE6-4342-B048-85BDC9FD1C3A}</a:tableStyleId>
+              </a:tblPr>
+              <a:tblGrid>
+                <a:gridCol w="7334864">
+                  <a:extLst>
+                    <a:ext uri="{9D8B030D-6E8A-4147-A177-3AD203B41FA5}">
+                      <a16:colId xmlns:a16="http://schemas.microsoft.com/office/drawing/2014/main" val="3064769547"/>
+                    </a:ext>
+                  </a:extLst>
+                </a:gridCol>
+              </a:tblGrid>
+              <a:tr h="737419">
+                <a:tc>
+                  <a:txBody>
+                    <a:bodyPr/>
+                    <a:lstStyle/>
+                    <a:p>
+                      <a:pPr algn="ctr"/>
+                      <a:r>
+                        <a:rPr lang="vi-VN" sz="2400" dirty="0">
+                          <a:solidFill>
+                            <a:srgbClr val="FF0000"/>
+                          </a:solidFill>
+                        </a:rPr>
+                        <a:t>Đồ Án Cơ Sở Nghành</a:t>
+                      </a:r>
+                      <a:endParaRPr lang="en-US" sz="2400" dirty="0">
+                        <a:solidFill>
+                          <a:srgbClr val="FF0000"/>
+                        </a:solidFill>
+                      </a:endParaRPr>
+                    </a:p>
+                  </a:txBody>
+                  <a:tcPr>
+                    <a:noFill/>
+                  </a:tcPr>
+                </a:tc>
+                <a:extLst>
+                  <a:ext uri="{0D108BD9-81ED-4DB2-BD59-A6C34878D82A}">
+                    <a16:rowId xmlns:a16="http://schemas.microsoft.com/office/drawing/2014/main" val="899278233"/>
+                  </a:ext>
+                </a:extLst>
+              </a:tr>
+            </a:tbl>
+          </a:graphicData>
+        </a:graphic>
+      </p:graphicFrame>
+      <p:graphicFrame>
+        <p:nvGraphicFramePr>
+          <p:cNvPr id="11" name="Table 10">
+            <a:extLst>
+              <a:ext uri="{FF2B5EF4-FFF2-40B4-BE49-F238E27FC236}">
+                <a16:creationId xmlns:a16="http://schemas.microsoft.com/office/drawing/2014/main" id="{56E2AC5A-96D8-232D-0266-0E9296749088}"/>
+              </a:ext>
+            </a:extLst>
+          </p:cNvPr>
+          <p:cNvGraphicFramePr>
+            <a:graphicFrameLocks noGrp="1"/>
+          </p:cNvGraphicFramePr>
+          <p:nvPr>
+            <p:extLst>
+              <p:ext uri="{D42A27DB-BD31-4B8C-83A1-F6EECF244321}">
+                <p14:modId xmlns:p14="http://schemas.microsoft.com/office/powerpoint/2010/main" val="1099017011"/>
+              </p:ext>
+            </p:extLst>
+          </p:nvPr>
+        </p:nvGraphicFramePr>
+        <p:xfrm>
+          <a:off x="924232" y="2684206"/>
+          <a:ext cx="10323870" cy="1396180"/>
+        </p:xfrm>
+        <a:graphic>
+          <a:graphicData uri="http://schemas.openxmlformats.org/drawingml/2006/table">
+            <a:tbl>
+              <a:tblPr firstRow="1" bandRow="1">
+                <a:tableStyleId>{5C22544A-7EE6-4342-B048-85BDC9FD1C3A}</a:tableStyleId>
+              </a:tblPr>
+              <a:tblGrid>
+                <a:gridCol w="10323870">
+                  <a:extLst>
+                    <a:ext uri="{9D8B030D-6E8A-4147-A177-3AD203B41FA5}">
+                      <a16:colId xmlns:a16="http://schemas.microsoft.com/office/drawing/2014/main" val="3741446507"/>
+                    </a:ext>
+                  </a:extLst>
+                </a:gridCol>
+              </a:tblGrid>
+              <a:tr h="1396180">
+                <a:tc>
+                  <a:txBody>
+                    <a:bodyPr/>
+                    <a:lstStyle/>
+                    <a:p>
+                      <a:pPr algn="ctr"/>
+                      <a:r>
+                        <a:rPr lang="vi-VN" sz="3600" dirty="0">
+                          <a:solidFill>
+                            <a:srgbClr val="FF0000"/>
+                          </a:solidFill>
+                        </a:rPr>
+                        <a:t>Xây Dựng Website Giới Thiệu Các Di Tích Lịch Sử Trên Địa Bàn Tỉnh Trà Vinh</a:t>
+                      </a:r>
+                      <a:endParaRPr lang="en-US" sz="3600" dirty="0">
+                        <a:solidFill>
+                          <a:srgbClr val="FF0000"/>
+                        </a:solidFill>
+                      </a:endParaRPr>
+                    </a:p>
+                  </a:txBody>
+                  <a:tcPr>
+                    <a:solidFill>
+                      <a:schemeClr val="bg1"/>
+                    </a:solidFill>
+                  </a:tcPr>
+                </a:tc>
+                <a:extLst>
+                  <a:ext uri="{0D108BD9-81ED-4DB2-BD59-A6C34878D82A}">
+                    <a16:rowId xmlns:a16="http://schemas.microsoft.com/office/drawing/2014/main" val="963225908"/>
+                  </a:ext>
+                </a:extLst>
+              </a:tr>
+            </a:tbl>
+          </a:graphicData>
+        </a:graphic>
+      </p:graphicFrame>
+      <p:graphicFrame>
+        <p:nvGraphicFramePr>
+          <p:cNvPr id="12" name="Table 11">
+            <a:extLst>
+              <a:ext uri="{FF2B5EF4-FFF2-40B4-BE49-F238E27FC236}">
+                <a16:creationId xmlns:a16="http://schemas.microsoft.com/office/drawing/2014/main" id="{D2A68F92-0F5F-4751-AB11-997E9613028F}"/>
+              </a:ext>
+            </a:extLst>
+          </p:cNvPr>
+          <p:cNvGraphicFramePr>
+            <a:graphicFrameLocks noGrp="1"/>
+          </p:cNvGraphicFramePr>
+          <p:nvPr>
+            <p:extLst>
+              <p:ext uri="{D42A27DB-BD31-4B8C-83A1-F6EECF244321}">
+                <p14:modId xmlns:p14="http://schemas.microsoft.com/office/powerpoint/2010/main" val="881111552"/>
+              </p:ext>
+            </p:extLst>
+          </p:nvPr>
+        </p:nvGraphicFramePr>
+        <p:xfrm>
+          <a:off x="3667432" y="4080386"/>
+          <a:ext cx="2831691" cy="1759974"/>
+        </p:xfrm>
+        <a:graphic>
+          <a:graphicData uri="http://schemas.openxmlformats.org/drawingml/2006/table">
+            <a:tbl>
+              <a:tblPr firstRow="1" bandRow="1">
+                <a:tableStyleId>{5C22544A-7EE6-4342-B048-85BDC9FD1C3A}</a:tableStyleId>
+              </a:tblPr>
+              <a:tblGrid>
+                <a:gridCol w="2831691">
+                  <a:extLst>
+                    <a:ext uri="{9D8B030D-6E8A-4147-A177-3AD203B41FA5}">
+                      <a16:colId xmlns:a16="http://schemas.microsoft.com/office/drawing/2014/main" val="985222658"/>
+                    </a:ext>
+                  </a:extLst>
+                </a:gridCol>
+              </a:tblGrid>
+              <a:tr h="1759974">
+                <a:tc>
+                  <a:txBody>
+                    <a:bodyPr/>
+                    <a:lstStyle/>
+                    <a:p>
+                      <a:r>
+                        <a:rPr lang="vi-VN" dirty="0">
+                          <a:solidFill>
+                            <a:schemeClr val="bg2">
+                              <a:lumMod val="10000"/>
+                            </a:schemeClr>
+                          </a:solidFill>
+                        </a:rPr>
+                        <a:t>Giảng Viên Hướng Dẫn:</a:t>
+                      </a:r>
+                    </a:p>
+                    <a:p>
+                      <a:endParaRPr lang="vi-VN" dirty="0">
+                        <a:solidFill>
+                          <a:schemeClr val="bg2">
+                            <a:lumMod val="10000"/>
+                          </a:schemeClr>
+                        </a:solidFill>
+                      </a:endParaRPr>
+                    </a:p>
+                    <a:p>
+                      <a:r>
+                        <a:rPr lang="vi-VN" dirty="0">
+                          <a:solidFill>
+                            <a:schemeClr val="bg2">
+                              <a:lumMod val="10000"/>
+                            </a:schemeClr>
+                          </a:solidFill>
+                        </a:rPr>
+                        <a:t>ThS. Võ Thành C</a:t>
+                      </a:r>
+                      <a:endParaRPr lang="en-US" dirty="0">
+                        <a:solidFill>
+                          <a:schemeClr val="bg2">
+                            <a:lumMod val="10000"/>
+                          </a:schemeClr>
+                        </a:solidFill>
+                      </a:endParaRPr>
+                    </a:p>
+                  </a:txBody>
+                  <a:tcPr>
+                    <a:noFill/>
+                  </a:tcPr>
+                </a:tc>
+                <a:extLst>
+                  <a:ext uri="{0D108BD9-81ED-4DB2-BD59-A6C34878D82A}">
+                    <a16:rowId xmlns:a16="http://schemas.microsoft.com/office/drawing/2014/main" val="4142351639"/>
+                  </a:ext>
+                </a:extLst>
+              </a:tr>
+            </a:tbl>
+          </a:graphicData>
+        </a:graphic>
+      </p:graphicFrame>
+      <p:graphicFrame>
+        <p:nvGraphicFramePr>
+          <p:cNvPr id="13" name="Table 12">
+            <a:extLst>
+              <a:ext uri="{FF2B5EF4-FFF2-40B4-BE49-F238E27FC236}">
+                <a16:creationId xmlns:a16="http://schemas.microsoft.com/office/drawing/2014/main" id="{38C10A1B-3A78-0BC9-46B3-4E56BC0E81B2}"/>
+              </a:ext>
+            </a:extLst>
+          </p:cNvPr>
+          <p:cNvGraphicFramePr>
+            <a:graphicFrameLocks noGrp="1"/>
+          </p:cNvGraphicFramePr>
+          <p:nvPr>
+            <p:extLst>
+              <p:ext uri="{D42A27DB-BD31-4B8C-83A1-F6EECF244321}">
+                <p14:modId xmlns:p14="http://schemas.microsoft.com/office/powerpoint/2010/main" val="608498452"/>
+              </p:ext>
+            </p:extLst>
+          </p:nvPr>
+        </p:nvGraphicFramePr>
+        <p:xfrm>
+          <a:off x="7328308" y="4080385"/>
+          <a:ext cx="2831691" cy="1759974"/>
+        </p:xfrm>
+        <a:graphic>
+          <a:graphicData uri="http://schemas.openxmlformats.org/drawingml/2006/table">
+            <a:tbl>
+              <a:tblPr firstRow="1" bandRow="1">
+                <a:tableStyleId>{5C22544A-7EE6-4342-B048-85BDC9FD1C3A}</a:tableStyleId>
+              </a:tblPr>
+              <a:tblGrid>
+                <a:gridCol w="2831691">
+                  <a:extLst>
+                    <a:ext uri="{9D8B030D-6E8A-4147-A177-3AD203B41FA5}">
+                      <a16:colId xmlns:a16="http://schemas.microsoft.com/office/drawing/2014/main" val="2133376033"/>
+                    </a:ext>
+                  </a:extLst>
+                </a:gridCol>
+              </a:tblGrid>
+              <a:tr h="1759974">
+                <a:tc>
+                  <a:txBody>
+                    <a:bodyPr/>
+                    <a:lstStyle/>
+                    <a:p>
+                      <a:r>
+                        <a:rPr lang="vi-VN" dirty="0">
+                          <a:solidFill>
+                            <a:schemeClr val="bg2">
+                              <a:lumMod val="10000"/>
+                            </a:schemeClr>
+                          </a:solidFill>
+                        </a:rPr>
+                        <a:t>Sinh Viên Thực Hiện:</a:t>
+                      </a:r>
+                    </a:p>
+                    <a:p>
+                      <a:r>
+                        <a:rPr lang="vi-VN" dirty="0">
+                          <a:solidFill>
+                            <a:schemeClr val="bg2">
+                              <a:lumMod val="10000"/>
+                            </a:schemeClr>
+                          </a:solidFill>
+                        </a:rPr>
+                        <a:t>Họ Và Tên: Thạch Nhựt Minh</a:t>
+                      </a:r>
+                    </a:p>
+                    <a:p>
+                      <a:r>
+                        <a:rPr lang="vi-VN" dirty="0">
+                          <a:solidFill>
+                            <a:schemeClr val="bg2">
+                              <a:lumMod val="10000"/>
+                            </a:schemeClr>
+                          </a:solidFill>
+                        </a:rPr>
+                        <a:t>MSSV: 110122115</a:t>
+                      </a:r>
+                    </a:p>
+                    <a:p>
+                      <a:r>
+                        <a:rPr lang="vi-VN" dirty="0">
+                          <a:solidFill>
+                            <a:schemeClr val="bg2">
+                              <a:lumMod val="10000"/>
+                            </a:schemeClr>
+                          </a:solidFill>
+                        </a:rPr>
+                        <a:t>Lớp: DA22TTB</a:t>
+                      </a:r>
+                      <a:endParaRPr lang="en-US" dirty="0">
+                        <a:solidFill>
+                          <a:schemeClr val="bg2">
+                            <a:lumMod val="10000"/>
+                          </a:schemeClr>
+                        </a:solidFill>
+                      </a:endParaRPr>
+                    </a:p>
+                  </a:txBody>
+                  <a:tcPr>
+                    <a:noFill/>
+                  </a:tcPr>
+                </a:tc>
+                <a:extLst>
+                  <a:ext uri="{0D108BD9-81ED-4DB2-BD59-A6C34878D82A}">
+                    <a16:rowId xmlns:a16="http://schemas.microsoft.com/office/drawing/2014/main" val="1791665553"/>
+                  </a:ext>
+                </a:extLst>
+              </a:tr>
+            </a:tbl>
+          </a:graphicData>
+        </a:graphic>
+      </p:graphicFrame>
+    </p:spTree>
+    <p:extLst>
+      <p:ext uri="{BB962C8B-B14F-4D97-AF65-F5344CB8AC3E}">
+        <p14:creationId xmlns:p14="http://schemas.microsoft.com/office/powerpoint/2010/main" val="1091122311"/>
+      </p:ext>
+    </p:extLst>
+  </p:cSld>
+  <p:clrMapOvr>
+    <a:masterClrMapping/>
+  </p:clrMapOvr>
+</p:sld>
+</file>
+
+<file path=ppt/slides/slide10.xml><?xml version="1.0" encoding="utf-8"?>
+<p:sld xmlns:a="http://schemas.openxmlformats.org/drawingml/2006/main" xmlns:r="http://schemas.openxmlformats.org/officeDocument/2006/relationships" xmlns:p="http://schemas.openxmlformats.org/presentationml/2006/main">
+  <p:cSld>
+    <p:spTree>
+      <p:nvGrpSpPr>
+        <p:cNvPr id="1" name=""/>
+        <p:cNvGrpSpPr/>
+        <p:nvPr/>
+      </p:nvGrpSpPr>
+      <p:grpSpPr>
+        <a:xfrm>
+          <a:off x="0" y="0"/>
+          <a:ext cx="0" cy="0"/>
+          <a:chOff x="0" y="0"/>
+          <a:chExt cx="0" cy="0"/>
+        </a:xfrm>
+      </p:grpSpPr>
+      <p:sp>
+        <p:nvSpPr>
+          <p:cNvPr id="2" name="Title 1">
+            <a:extLst>
+              <a:ext uri="{FF2B5EF4-FFF2-40B4-BE49-F238E27FC236}">
+                <a16:creationId xmlns:a16="http://schemas.microsoft.com/office/drawing/2014/main" id="{C23A2193-10E1-3B17-D2F1-FD19DE8CC1FD}"/>
+              </a:ext>
+            </a:extLst>
+          </p:cNvPr>
+          <p:cNvSpPr>
+            <a:spLocks noGrp="1"/>
+          </p:cNvSpPr>
+          <p:nvPr>
+            <p:ph type="title"/>
+          </p:nvPr>
+        </p:nvSpPr>
+        <p:spPr>
+          <a:xfrm>
+            <a:off x="838200" y="511277"/>
+            <a:ext cx="1973826" cy="5665686"/>
+          </a:xfrm>
+        </p:spPr>
+        <p:txBody>
+          <a:bodyPr/>
+          <a:lstStyle/>
+          <a:p>
+            <a:pPr marL="571500" indent="-571500">
+              <a:buFont typeface="Wingdings" panose="05000000000000000000" pitchFamily="2" charset="2"/>
+              <a:buChar char="v"/>
+            </a:pPr>
+            <a:r>
+              <a:rPr lang="vi-VN" dirty="0">
+                <a:solidFill>
+                  <a:srgbClr val="FF0000"/>
+                </a:solidFill>
+              </a:rPr>
+              <a:t>Về trang liên hệ.</a:t>
+            </a:r>
+            <a:endParaRPr lang="en-US" dirty="0">
+              <a:solidFill>
+                <a:srgbClr val="FF0000"/>
+              </a:solidFill>
+            </a:endParaRPr>
+          </a:p>
+        </p:txBody>
+      </p:sp>
+      <p:sp>
+        <p:nvSpPr>
+          <p:cNvPr id="3" name="Content Placeholder 2">
+            <a:extLst>
+              <a:ext uri="{FF2B5EF4-FFF2-40B4-BE49-F238E27FC236}">
+                <a16:creationId xmlns:a16="http://schemas.microsoft.com/office/drawing/2014/main" id="{6BC6F12E-E7E1-C106-7975-ADCF121BCDAE}"/>
+              </a:ext>
+            </a:extLst>
+          </p:cNvPr>
+          <p:cNvSpPr>
+            <a:spLocks noGrp="1"/>
+          </p:cNvSpPr>
+          <p:nvPr>
+            <p:ph idx="1"/>
+          </p:nvPr>
+        </p:nvSpPr>
+        <p:spPr>
+          <a:xfrm>
+            <a:off x="2812027" y="511277"/>
+            <a:ext cx="8541773" cy="5665686"/>
+          </a:xfrm>
+        </p:spPr>
+        <p:txBody>
+          <a:bodyPr/>
+          <a:lstStyle/>
+          <a:p>
+            <a:r>
+              <a:rPr lang="vi-VN" dirty="0"/>
+              <a:t>Liên hệ đã đưa ra thông tin về cách liên hệ đến admin người tạo ra trang web.</a:t>
+            </a:r>
+          </a:p>
+          <a:p>
+            <a:pPr marL="0" indent="0">
+              <a:buNone/>
+            </a:pPr>
+            <a:endParaRPr lang="en-US" dirty="0"/>
+          </a:p>
+        </p:txBody>
+      </p:sp>
+      <p:pic>
+        <p:nvPicPr>
+          <p:cNvPr id="5" name="Picture 4">
+            <a:extLst>
+              <a:ext uri="{FF2B5EF4-FFF2-40B4-BE49-F238E27FC236}">
+                <a16:creationId xmlns:a16="http://schemas.microsoft.com/office/drawing/2014/main" id="{E73C1AD9-DBDD-5217-AB9B-8017BA40D750}"/>
+              </a:ext>
+            </a:extLst>
+          </p:cNvPr>
+          <p:cNvPicPr>
+            <a:picLocks noChangeAspect="1"/>
+          </p:cNvPicPr>
+          <p:nvPr/>
+        </p:nvPicPr>
+        <p:blipFill>
+          <a:blip r:embed="rId2"/>
+          <a:stretch>
+            <a:fillRect/>
+          </a:stretch>
+        </p:blipFill>
+        <p:spPr>
+          <a:xfrm>
+            <a:off x="3098521" y="1431832"/>
+            <a:ext cx="2648734" cy="4398696"/>
+          </a:xfrm>
+          <a:prstGeom prst="rect">
+            <a:avLst/>
+          </a:prstGeom>
+        </p:spPr>
+      </p:pic>
+      <p:graphicFrame>
+        <p:nvGraphicFramePr>
+          <p:cNvPr id="6" name="Table 5">
+            <a:extLst>
+              <a:ext uri="{FF2B5EF4-FFF2-40B4-BE49-F238E27FC236}">
+                <a16:creationId xmlns:a16="http://schemas.microsoft.com/office/drawing/2014/main" id="{52D47687-C0DA-5CFE-0961-A0B25E088D5E}"/>
+              </a:ext>
+            </a:extLst>
+          </p:cNvPr>
+          <p:cNvGraphicFramePr>
+            <a:graphicFrameLocks noGrp="1"/>
+          </p:cNvGraphicFramePr>
+          <p:nvPr>
+            <p:extLst>
+              <p:ext uri="{D42A27DB-BD31-4B8C-83A1-F6EECF244321}">
+                <p14:modId xmlns:p14="http://schemas.microsoft.com/office/powerpoint/2010/main" val="3176984946"/>
+              </p:ext>
+            </p:extLst>
+          </p:nvPr>
+        </p:nvGraphicFramePr>
+        <p:xfrm>
+          <a:off x="5747256" y="1431832"/>
+          <a:ext cx="4832254" cy="4398696"/>
+        </p:xfrm>
+        <a:graphic>
+          <a:graphicData uri="http://schemas.openxmlformats.org/drawingml/2006/table">
+            <a:tbl>
+              <a:tblPr firstRow="1" bandRow="1">
+                <a:tableStyleId>{5C22544A-7EE6-4342-B048-85BDC9FD1C3A}</a:tableStyleId>
+              </a:tblPr>
+              <a:tblGrid>
+                <a:gridCol w="4832254">
+                  <a:extLst>
+                    <a:ext uri="{9D8B030D-6E8A-4147-A177-3AD203B41FA5}">
+                      <a16:colId xmlns:a16="http://schemas.microsoft.com/office/drawing/2014/main" val="2679755447"/>
+                    </a:ext>
+                  </a:extLst>
+                </a:gridCol>
+              </a:tblGrid>
+              <a:tr h="4398696">
+                <a:tc>
+                  <a:txBody>
+                    <a:bodyPr/>
+                    <a:lstStyle/>
+                    <a:p>
+                      <a:pPr marL="285750" indent="-285750">
+                        <a:buFont typeface="Wingdings" panose="05000000000000000000" pitchFamily="2" charset="2"/>
+                        <a:buChar char="v"/>
+                      </a:pPr>
+                      <a:r>
+                        <a:rPr lang="vi-VN" dirty="0">
+                          <a:solidFill>
+                            <a:schemeClr val="tx1"/>
+                          </a:solidFill>
+                        </a:rPr>
+                        <a:t>Chức năng chính trong trang này là chức năng gửi tin nhắn phản hồi của du khác, mọi góp ý phản hồi đều được ghi nhận lại.</a:t>
+                      </a:r>
+                    </a:p>
+                    <a:p>
+                      <a:pPr marL="285750" indent="-285750">
+                        <a:buFont typeface="Wingdings" panose="05000000000000000000" pitchFamily="2" charset="2"/>
+                        <a:buChar char="v"/>
+                      </a:pPr>
+                      <a:endParaRPr lang="vi-VN" dirty="0"/>
+                    </a:p>
+                    <a:p>
+                      <a:pPr marL="285750" indent="-285750">
+                        <a:buFont typeface="Wingdings" panose="05000000000000000000" pitchFamily="2" charset="2"/>
+                        <a:buChar char="v"/>
+                      </a:pPr>
+                      <a:endParaRPr lang="vi-VN" dirty="0"/>
+                    </a:p>
+                    <a:p>
+                      <a:pPr marL="285750" indent="-285750">
+                        <a:buFont typeface="Wingdings" panose="05000000000000000000" pitchFamily="2" charset="2"/>
+                        <a:buChar char="v"/>
+                      </a:pPr>
+                      <a:endParaRPr lang="vi-VN" dirty="0"/>
+                    </a:p>
+                    <a:p>
+                      <a:pPr marL="285750" indent="-285750">
+                        <a:buFont typeface="Wingdings" panose="05000000000000000000" pitchFamily="2" charset="2"/>
+                        <a:buChar char="v"/>
+                      </a:pPr>
+                      <a:endParaRPr lang="vi-VN" dirty="0"/>
+                    </a:p>
+                    <a:p>
+                      <a:pPr marL="285750" indent="-285750">
+                        <a:buFont typeface="Wingdings" panose="05000000000000000000" pitchFamily="2" charset="2"/>
+                        <a:buChar char="v"/>
+                      </a:pPr>
+                      <a:endParaRPr lang="vi-VN" dirty="0"/>
+                    </a:p>
+                    <a:p>
+                      <a:pPr marL="285750" indent="-285750">
+                        <a:buFont typeface="Wingdings" panose="05000000000000000000" pitchFamily="2" charset="2"/>
+                        <a:buChar char="v"/>
+                      </a:pPr>
+                      <a:endParaRPr lang="vi-VN" dirty="0"/>
+                    </a:p>
+                    <a:p>
+                      <a:pPr marL="285750" indent="-285750">
+                        <a:buFont typeface="Wingdings" panose="05000000000000000000" pitchFamily="2" charset="2"/>
+                        <a:buChar char="v"/>
+                      </a:pPr>
+                      <a:endParaRPr lang="vi-VN" dirty="0"/>
+                    </a:p>
+                    <a:p>
+                      <a:pPr marL="285750" indent="-285750">
+                        <a:buFont typeface="Wingdings" panose="05000000000000000000" pitchFamily="2" charset="2"/>
+                        <a:buChar char="v"/>
+                      </a:pPr>
+                      <a:endParaRPr lang="vi-VN" dirty="0"/>
+                    </a:p>
+                    <a:p>
+                      <a:pPr marL="285750" indent="-285750">
+                        <a:buFont typeface="Arial" panose="020B0604020202020204" pitchFamily="34" charset="0"/>
+                        <a:buChar char="•"/>
+                      </a:pPr>
+                      <a:r>
+                        <a:rPr lang="vi-VN" dirty="0">
+                          <a:solidFill>
+                            <a:schemeClr val="tx1"/>
+                          </a:solidFill>
+                        </a:rPr>
+                        <a:t>Các phản hồi của người đọc về trang web sẽ được ghi nhận lại để cãi thiện.</a:t>
+                      </a:r>
+                      <a:endParaRPr lang="en-US" dirty="0">
+                        <a:solidFill>
+                          <a:schemeClr val="tx1"/>
+                        </a:solidFill>
+                      </a:endParaRPr>
+                    </a:p>
+                  </a:txBody>
+                  <a:tcPr>
+                    <a:noFill/>
+                  </a:tcPr>
+                </a:tc>
+                <a:extLst>
+                  <a:ext uri="{0D108BD9-81ED-4DB2-BD59-A6C34878D82A}">
+                    <a16:rowId xmlns:a16="http://schemas.microsoft.com/office/drawing/2014/main" val="277963379"/>
+                  </a:ext>
+                </a:extLst>
+              </a:tr>
+            </a:tbl>
+          </a:graphicData>
+        </a:graphic>
+      </p:graphicFrame>
+      <p:pic>
+        <p:nvPicPr>
+          <p:cNvPr id="8" name="Picture 7">
+            <a:extLst>
+              <a:ext uri="{FF2B5EF4-FFF2-40B4-BE49-F238E27FC236}">
+                <a16:creationId xmlns:a16="http://schemas.microsoft.com/office/drawing/2014/main" id="{03695B80-E42B-EF12-C776-E1EB25E5EAFF}"/>
+              </a:ext>
+            </a:extLst>
+          </p:cNvPr>
+          <p:cNvPicPr>
+            <a:picLocks noChangeAspect="1"/>
+          </p:cNvPicPr>
+          <p:nvPr/>
+        </p:nvPicPr>
+        <p:blipFill>
+          <a:blip r:embed="rId3"/>
+          <a:stretch>
+            <a:fillRect/>
+          </a:stretch>
+        </p:blipFill>
+        <p:spPr>
+          <a:xfrm>
+            <a:off x="5747255" y="2598794"/>
+            <a:ext cx="4832254" cy="2012535"/>
+          </a:xfrm>
+          <a:prstGeom prst="rect">
+            <a:avLst/>
+          </a:prstGeom>
+        </p:spPr>
+      </p:pic>
+      <p:pic>
+        <p:nvPicPr>
+          <p:cNvPr id="7" name="Picture 6">
+            <a:extLst>
+              <a:ext uri="{FF2B5EF4-FFF2-40B4-BE49-F238E27FC236}">
+                <a16:creationId xmlns:a16="http://schemas.microsoft.com/office/drawing/2014/main" id="{E3CEBBE8-7E30-3F52-757A-E4FC61F4F5D7}"/>
+              </a:ext>
+            </a:extLst>
+          </p:cNvPr>
+          <p:cNvPicPr>
+            <a:picLocks noChangeAspect="1"/>
+          </p:cNvPicPr>
+          <p:nvPr/>
+        </p:nvPicPr>
+        <p:blipFill>
+          <a:blip r:embed="rId4"/>
+          <a:stretch>
+            <a:fillRect/>
+          </a:stretch>
+        </p:blipFill>
+        <p:spPr>
+          <a:xfrm>
+            <a:off x="5747254" y="3588774"/>
+            <a:ext cx="902511" cy="1022555"/>
+          </a:xfrm>
+          <a:prstGeom prst="rect">
+            <a:avLst/>
+          </a:prstGeom>
+        </p:spPr>
+      </p:pic>
+    </p:spTree>
+    <p:extLst>
+      <p:ext uri="{BB962C8B-B14F-4D97-AF65-F5344CB8AC3E}">
+        <p14:creationId xmlns:p14="http://schemas.microsoft.com/office/powerpoint/2010/main" val="796407206"/>
+      </p:ext>
+    </p:extLst>
+  </p:cSld>
+  <p:clrMapOvr>
+    <a:masterClrMapping/>
+  </p:clrMapOvr>
+  <p:transition spd="slow">
+    <p:cover/>
+  </p:transition>
+</p:sld>
+</file>
+
+<file path=ppt/slides/slide11.xml><?xml version="1.0" encoding="utf-8"?>
+<p:sld xmlns:a="http://schemas.openxmlformats.org/drawingml/2006/main" xmlns:r="http://schemas.openxmlformats.org/officeDocument/2006/relationships" xmlns:p="http://schemas.openxmlformats.org/presentationml/2006/main">
+  <p:cSld>
+    <p:spTree>
+      <p:nvGrpSpPr>
+        <p:cNvPr id="1" name=""/>
+        <p:cNvGrpSpPr/>
+        <p:nvPr/>
+      </p:nvGrpSpPr>
+      <p:grpSpPr>
+        <a:xfrm>
+          <a:off x="0" y="0"/>
+          <a:ext cx="0" cy="0"/>
+          <a:chOff x="0" y="0"/>
+          <a:chExt cx="0" cy="0"/>
+        </a:xfrm>
+      </p:grpSpPr>
+      <p:sp>
+        <p:nvSpPr>
+          <p:cNvPr id="2" name="Title 1">
+            <a:extLst>
+              <a:ext uri="{FF2B5EF4-FFF2-40B4-BE49-F238E27FC236}">
+                <a16:creationId xmlns:a16="http://schemas.microsoft.com/office/drawing/2014/main" id="{604D97C4-EB95-7C03-60A8-1F99C98BD8C6}"/>
+              </a:ext>
+            </a:extLst>
+          </p:cNvPr>
+          <p:cNvSpPr>
+            <a:spLocks noGrp="1"/>
+          </p:cNvSpPr>
+          <p:nvPr>
+            <p:ph type="title"/>
+          </p:nvPr>
+        </p:nvSpPr>
+        <p:spPr/>
+        <p:txBody>
+          <a:bodyPr/>
+          <a:lstStyle/>
+          <a:p>
+            <a:pPr marL="571500" indent="-571500">
+              <a:buFont typeface="Wingdings" panose="05000000000000000000" pitchFamily="2" charset="2"/>
+              <a:buChar char="v"/>
+            </a:pPr>
+            <a:r>
+              <a:rPr lang="vi-VN" dirty="0">
+                <a:solidFill>
+                  <a:srgbClr val="FF0000"/>
+                </a:solidFill>
+              </a:rPr>
+              <a:t>Footer là phần cuối cùng của trang web</a:t>
+            </a:r>
+            <a:br>
+              <a:rPr lang="vi-VN" dirty="0">
+                <a:solidFill>
+                  <a:srgbClr val="FF0000"/>
+                </a:solidFill>
+              </a:rPr>
+            </a:br>
+            <a:endParaRPr lang="en-US" dirty="0">
+              <a:solidFill>
+                <a:srgbClr val="FF0000"/>
+              </a:solidFill>
+            </a:endParaRPr>
+          </a:p>
+        </p:txBody>
+      </p:sp>
+      <p:graphicFrame>
+        <p:nvGraphicFramePr>
+          <p:cNvPr id="3" name="Table 2">
+            <a:extLst>
+              <a:ext uri="{FF2B5EF4-FFF2-40B4-BE49-F238E27FC236}">
+                <a16:creationId xmlns:a16="http://schemas.microsoft.com/office/drawing/2014/main" id="{524798BB-39CB-1FBF-6741-4B2FC81969BC}"/>
+              </a:ext>
+            </a:extLst>
+          </p:cNvPr>
+          <p:cNvGraphicFramePr>
+            <a:graphicFrameLocks noGrp="1"/>
+          </p:cNvGraphicFramePr>
+          <p:nvPr>
+            <p:extLst>
+              <p:ext uri="{D42A27DB-BD31-4B8C-83A1-F6EECF244321}">
+                <p14:modId xmlns:p14="http://schemas.microsoft.com/office/powerpoint/2010/main" val="559873029"/>
+              </p:ext>
+            </p:extLst>
+          </p:nvPr>
+        </p:nvGraphicFramePr>
+        <p:xfrm>
+          <a:off x="1232809" y="4336026"/>
+          <a:ext cx="9726382" cy="1130708"/>
+        </p:xfrm>
+        <a:graphic>
+          <a:graphicData uri="http://schemas.openxmlformats.org/drawingml/2006/table">
+            <a:tbl>
+              <a:tblPr firstRow="1" bandRow="1">
+                <a:tableStyleId>{5C22544A-7EE6-4342-B048-85BDC9FD1C3A}</a:tableStyleId>
+              </a:tblPr>
+              <a:tblGrid>
+                <a:gridCol w="9726382">
+                  <a:extLst>
+                    <a:ext uri="{9D8B030D-6E8A-4147-A177-3AD203B41FA5}">
+                      <a16:colId xmlns:a16="http://schemas.microsoft.com/office/drawing/2014/main" val="641891578"/>
+                    </a:ext>
+                  </a:extLst>
+                </a:gridCol>
+              </a:tblGrid>
+              <a:tr h="1130708">
+                <a:tc>
+                  <a:txBody>
+                    <a:bodyPr/>
+                    <a:lstStyle/>
+                    <a:p>
+                      <a:pPr marL="0" marR="0" lvl="0" indent="0" algn="l" defTabSz="914400" rtl="0" eaLnBrk="1" fontAlgn="auto" latinLnBrk="0" hangingPunct="1">
+                        <a:lnSpc>
+                          <a:spcPct val="100000"/>
+                        </a:lnSpc>
+                        <a:spcBef>
+                          <a:spcPts val="0"/>
+                        </a:spcBef>
+                        <a:spcAft>
+                          <a:spcPts val="0"/>
+                        </a:spcAft>
+                        <a:buClrTx/>
+                        <a:buSzTx/>
+                        <a:buFontTx/>
+                        <a:buNone/>
+                        <a:tabLst/>
+                        <a:defRPr/>
+                      </a:pPr>
+                      <a:r>
+                        <a:rPr lang="vi-VN" dirty="0">
+                          <a:solidFill>
+                            <a:schemeClr val="tx1"/>
+                          </a:solidFill>
+                        </a:rPr>
+                        <a:t>Đối với phần Footer có các thông tin địa chỉ và liên hệ, và tạo thêm chức năng truy cập.</a:t>
+                      </a:r>
+                    </a:p>
+                    <a:p>
+                      <a:pPr marL="0" marR="0" lvl="0" indent="0" algn="l" defTabSz="914400" rtl="0" eaLnBrk="1" fontAlgn="auto" latinLnBrk="0" hangingPunct="1">
+                        <a:lnSpc>
+                          <a:spcPct val="100000"/>
+                        </a:lnSpc>
+                        <a:spcBef>
+                          <a:spcPts val="0"/>
+                        </a:spcBef>
+                        <a:spcAft>
+                          <a:spcPts val="0"/>
+                        </a:spcAft>
+                        <a:buClrTx/>
+                        <a:buSzTx/>
+                        <a:buFontTx/>
+                        <a:buNone/>
+                        <a:tabLst/>
+                        <a:defRPr/>
+                      </a:pPr>
+                      <a:r>
+                        <a:rPr lang="vi-VN" dirty="0">
+                          <a:solidFill>
+                            <a:schemeClr val="tx1"/>
+                          </a:solidFill>
+                        </a:rPr>
+                        <a:t>Footer cung cấp tên đề tài báo cáo Cơ Sở Nghành đang làm của tôi.</a:t>
+                      </a:r>
+                      <a:endParaRPr lang="en-US" dirty="0">
+                        <a:solidFill>
+                          <a:schemeClr val="tx1"/>
+                        </a:solidFill>
+                      </a:endParaRPr>
+                    </a:p>
+                    <a:p>
+                      <a:endParaRPr lang="en-US" dirty="0"/>
+                    </a:p>
+                  </a:txBody>
+                  <a:tcPr>
+                    <a:noFill/>
+                  </a:tcPr>
+                </a:tc>
+                <a:extLst>
+                  <a:ext uri="{0D108BD9-81ED-4DB2-BD59-A6C34878D82A}">
+                    <a16:rowId xmlns:a16="http://schemas.microsoft.com/office/drawing/2014/main" val="2065553542"/>
+                  </a:ext>
+                </a:extLst>
+              </a:tr>
+            </a:tbl>
+          </a:graphicData>
+        </a:graphic>
+      </p:graphicFrame>
+      <p:pic>
+        <p:nvPicPr>
+          <p:cNvPr id="12" name="Content Placeholder 11">
+            <a:extLst>
+              <a:ext uri="{FF2B5EF4-FFF2-40B4-BE49-F238E27FC236}">
+                <a16:creationId xmlns:a16="http://schemas.microsoft.com/office/drawing/2014/main" id="{F920E122-835B-2613-5482-87EFDB558375}"/>
+              </a:ext>
+            </a:extLst>
+          </p:cNvPr>
+          <p:cNvPicPr>
+            <a:picLocks noGrp="1" noChangeAspect="1"/>
+          </p:cNvPicPr>
+          <p:nvPr>
+            <p:ph idx="1"/>
+          </p:nvPr>
+        </p:nvPicPr>
+        <p:blipFill>
+          <a:blip r:embed="rId2"/>
+          <a:stretch>
+            <a:fillRect/>
+          </a:stretch>
+        </p:blipFill>
+        <p:spPr>
+          <a:xfrm>
+            <a:off x="1232809" y="1573161"/>
+            <a:ext cx="9726382" cy="2762865"/>
+          </a:xfrm>
+        </p:spPr>
+      </p:pic>
+    </p:spTree>
+    <p:extLst>
+      <p:ext uri="{BB962C8B-B14F-4D97-AF65-F5344CB8AC3E}">
+        <p14:creationId xmlns:p14="http://schemas.microsoft.com/office/powerpoint/2010/main" val="4246578007"/>
+      </p:ext>
+    </p:extLst>
+  </p:cSld>
+  <p:clrMapOvr>
+    <a:masterClrMapping/>
+  </p:clrMapOvr>
+  <mc:AlternateContent xmlns:mc="http://schemas.openxmlformats.org/markup-compatibility/2006" xmlns:p14="http://schemas.microsoft.com/office/powerpoint/2010/main">
+    <mc:Choice Requires="p14">
+      <p:transition spd="slow" p14:dur="3400">
+        <p14:reveal/>
+      </p:transition>
+    </mc:Choice>
+    <mc:Fallback xmlns="">
+      <p:transition spd="slow">
+        <p:fade/>
+      </p:transition>
+    </mc:Fallback>
+  </mc:AlternateContent>
+</p:sld>
+</file>
+
+<file path=ppt/slides/slide12.xml><?xml version="1.0" encoding="utf-8"?>
+<p:sld xmlns:a="http://schemas.openxmlformats.org/drawingml/2006/main" xmlns:r="http://schemas.openxmlformats.org/officeDocument/2006/relationships" xmlns:p="http://schemas.openxmlformats.org/presentationml/2006/main">
+  <p:cSld>
+    <p:spTree>
+      <p:nvGrpSpPr>
+        <p:cNvPr id="1" name=""/>
+        <p:cNvGrpSpPr/>
+        <p:nvPr/>
+      </p:nvGrpSpPr>
+      <p:grpSpPr>
+        <a:xfrm>
+          <a:off x="0" y="0"/>
+          <a:ext cx="0" cy="0"/>
+          <a:chOff x="0" y="0"/>
+          <a:chExt cx="0" cy="0"/>
+        </a:xfrm>
+      </p:grpSpPr>
+      <p:graphicFrame>
+        <p:nvGraphicFramePr>
+          <p:cNvPr id="5" name="Content Placeholder 4">
+            <a:extLst>
+              <a:ext uri="{FF2B5EF4-FFF2-40B4-BE49-F238E27FC236}">
+                <a16:creationId xmlns:a16="http://schemas.microsoft.com/office/drawing/2014/main" id="{64232058-9D9B-F98B-9BAD-60E880720E67}"/>
+              </a:ext>
+            </a:extLst>
+          </p:cNvPr>
+          <p:cNvGraphicFramePr>
+            <a:graphicFrameLocks noGrp="1"/>
+          </p:cNvGraphicFramePr>
+          <p:nvPr>
+            <p:ph idx="1"/>
+            <p:extLst>
+              <p:ext uri="{D42A27DB-BD31-4B8C-83A1-F6EECF244321}">
+                <p14:modId xmlns:p14="http://schemas.microsoft.com/office/powerpoint/2010/main" val="658552551"/>
+              </p:ext>
+            </p:extLst>
+          </p:nvPr>
+        </p:nvGraphicFramePr>
+        <p:xfrm>
+          <a:off x="838200" y="2674374"/>
+          <a:ext cx="10515600" cy="1740310"/>
+        </p:xfrm>
+        <a:graphic>
+          <a:graphicData uri="http://schemas.openxmlformats.org/drawingml/2006/table">
+            <a:tbl>
+              <a:tblPr firstRow="1" bandRow="1">
+                <a:tableStyleId>{5C22544A-7EE6-4342-B048-85BDC9FD1C3A}</a:tableStyleId>
+              </a:tblPr>
+              <a:tblGrid>
+                <a:gridCol w="10515600">
+                  <a:extLst>
+                    <a:ext uri="{9D8B030D-6E8A-4147-A177-3AD203B41FA5}">
+                      <a16:colId xmlns:a16="http://schemas.microsoft.com/office/drawing/2014/main" val="1359187029"/>
+                    </a:ext>
+                  </a:extLst>
+                </a:gridCol>
+              </a:tblGrid>
+              <a:tr h="1740310">
+                <a:tc>
+                  <a:txBody>
+                    <a:bodyPr/>
+                    <a:lstStyle/>
+                    <a:p>
+                      <a:pPr algn="ctr"/>
+                      <a:r>
+                        <a:rPr lang="vi-VN" sz="2400" dirty="0">
+                          <a:solidFill>
+                            <a:schemeClr val="tx1"/>
+                          </a:solidFill>
+                        </a:rPr>
+                        <a:t>Cảm Ơn Quý Thầy Cô Đã Lắng Nghe Phần Trình Bày Của Em.</a:t>
+                      </a:r>
+                    </a:p>
+                    <a:p>
+                      <a:pPr algn="ctr"/>
+                      <a:r>
+                        <a:rPr lang="vi-VN" sz="2400" dirty="0">
+                          <a:solidFill>
+                            <a:schemeClr val="tx1"/>
+                          </a:solidFill>
+                        </a:rPr>
+                        <a:t>Em Chúc Quý Thầy Cô Thật Nhiều Sức Khỏe.</a:t>
+                      </a:r>
+                    </a:p>
+                    <a:p>
+                      <a:pPr algn="ctr"/>
+                      <a:r>
+                        <a:rPr lang="vi-VN" sz="2400" dirty="0">
+                          <a:solidFill>
+                            <a:schemeClr val="tx1"/>
+                          </a:solidFill>
+                        </a:rPr>
+                        <a:t>Trân Trong!</a:t>
+                      </a:r>
+                      <a:endParaRPr lang="en-US" sz="2400" dirty="0">
+                        <a:solidFill>
+                          <a:schemeClr val="tx1"/>
+                        </a:solidFill>
+                      </a:endParaRPr>
+                    </a:p>
+                  </a:txBody>
+                  <a:tcPr>
+                    <a:noFill/>
+                  </a:tcPr>
+                </a:tc>
+                <a:extLst>
+                  <a:ext uri="{0D108BD9-81ED-4DB2-BD59-A6C34878D82A}">
+                    <a16:rowId xmlns:a16="http://schemas.microsoft.com/office/drawing/2014/main" val="768696071"/>
+                  </a:ext>
+                </a:extLst>
+              </a:tr>
+            </a:tbl>
+          </a:graphicData>
+        </a:graphic>
+      </p:graphicFrame>
+      <p:sp>
+        <p:nvSpPr>
+          <p:cNvPr id="4" name="Rectangle 3">
+            <a:extLst>
+              <a:ext uri="{FF2B5EF4-FFF2-40B4-BE49-F238E27FC236}">
+                <a16:creationId xmlns:a16="http://schemas.microsoft.com/office/drawing/2014/main" id="{1BECA6E2-BB89-7F58-67A8-877ECEFBF71C}"/>
+              </a:ext>
+            </a:extLst>
+          </p:cNvPr>
+          <p:cNvSpPr/>
+          <p:nvPr/>
+        </p:nvSpPr>
+        <p:spPr>
+          <a:xfrm>
+            <a:off x="855406" y="403123"/>
+            <a:ext cx="10520517" cy="5732206"/>
+          </a:xfrm>
+          <a:prstGeom prst="rect">
+            <a:avLst/>
+          </a:prstGeom>
+          <a:noFill/>
+          <a:ln w="123825"/>
+        </p:spPr>
+        <p:style>
+          <a:lnRef idx="2">
+            <a:schemeClr val="accent1">
+              <a:shade val="15000"/>
+            </a:schemeClr>
+          </a:lnRef>
+          <a:fillRef idx="1">
+            <a:schemeClr val="accent1"/>
+          </a:fillRef>
+          <a:effectRef idx="0">
+            <a:schemeClr val="accent1"/>
+          </a:effectRef>
+          <a:fontRef idx="minor">
+            <a:schemeClr val="lt1"/>
+          </a:fontRef>
+        </p:style>
+        <p:txBody>
+          <a:bodyPr rtlCol="0" anchor="ctr"/>
+          <a:lstStyle/>
+          <a:p>
+            <a:pPr algn="ctr"/>
+            <a:endParaRPr lang="en-US"/>
+          </a:p>
+        </p:txBody>
+      </p:sp>
+    </p:spTree>
+    <p:extLst>
+      <p:ext uri="{BB962C8B-B14F-4D97-AF65-F5344CB8AC3E}">
+        <p14:creationId xmlns:p14="http://schemas.microsoft.com/office/powerpoint/2010/main" val="187435791"/>
+      </p:ext>
+    </p:extLst>
+  </p:cSld>
+  <p:clrMapOvr>
+    <a:masterClrMapping/>
+  </p:clrMapOvr>
+</p:sld>
+</file>
+
+<file path=ppt/slides/slide2.xml><?xml version="1.0" encoding="utf-8"?>
+<p:sld xmlns:a="http://schemas.openxmlformats.org/drawingml/2006/main" xmlns:r="http://schemas.openxmlformats.org/officeDocument/2006/relationships" xmlns:p="http://schemas.openxmlformats.org/presentationml/2006/main">
+  <p:cSld>
+    <p:spTree>
+      <p:nvGrpSpPr>
+        <p:cNvPr id="1" name=""/>
+        <p:cNvGrpSpPr/>
+        <p:nvPr/>
+      </p:nvGrpSpPr>
+      <p:grpSpPr>
+        <a:xfrm>
+          <a:off x="0" y="0"/>
+          <a:ext cx="0" cy="0"/>
+          <a:chOff x="0" y="0"/>
+          <a:chExt cx="0" cy="0"/>
+        </a:xfrm>
+      </p:grpSpPr>
+      <p:sp>
+        <p:nvSpPr>
+          <p:cNvPr id="2" name="Title 1">
+            <a:extLst>
+              <a:ext uri="{FF2B5EF4-FFF2-40B4-BE49-F238E27FC236}">
                 <a16:creationId xmlns:a16="http://schemas.microsoft.com/office/drawing/2014/main" id="{468DAE57-6C98-6911-0BA7-F10D34334835}"/>
               </a:ext>
             </a:extLst>
@@ -3461,7 +4810,7 @@
         </p:blipFill>
         <p:spPr>
           <a:xfrm>
-            <a:off x="1524000" y="1759973"/>
+            <a:off x="1466289" y="1759974"/>
             <a:ext cx="9271819" cy="3854245"/>
           </a:xfrm>
           <a:prstGeom prst="rect">
@@ -3495,6 +4844,80 @@
           </a:sp3d>
         </p:spPr>
       </p:pic>
+      <p:graphicFrame>
+        <p:nvGraphicFramePr>
+          <p:cNvPr id="4" name="Table 3">
+            <a:extLst>
+              <a:ext uri="{FF2B5EF4-FFF2-40B4-BE49-F238E27FC236}">
+                <a16:creationId xmlns:a16="http://schemas.microsoft.com/office/drawing/2014/main" id="{EF068406-1794-A746-470A-60D7C444E3F5}"/>
+              </a:ext>
+            </a:extLst>
+          </p:cNvPr>
+          <p:cNvGraphicFramePr>
+            <a:graphicFrameLocks noGrp="1"/>
+          </p:cNvGraphicFramePr>
+          <p:nvPr>
+            <p:extLst>
+              <p:ext uri="{D42A27DB-BD31-4B8C-83A1-F6EECF244321}">
+                <p14:modId xmlns:p14="http://schemas.microsoft.com/office/powerpoint/2010/main" val="921961178"/>
+              </p:ext>
+            </p:extLst>
+          </p:nvPr>
+        </p:nvGraphicFramePr>
+        <p:xfrm>
+          <a:off x="8662219" y="2458065"/>
+          <a:ext cx="2075888" cy="3156153"/>
+        </p:xfrm>
+        <a:graphic>
+          <a:graphicData uri="http://schemas.openxmlformats.org/drawingml/2006/table">
+            <a:tbl>
+              <a:tblPr firstRow="1" bandRow="1">
+                <a:tableStyleId>{5C22544A-7EE6-4342-B048-85BDC9FD1C3A}</a:tableStyleId>
+              </a:tblPr>
+              <a:tblGrid>
+                <a:gridCol w="2075888">
+                  <a:extLst>
+                    <a:ext uri="{9D8B030D-6E8A-4147-A177-3AD203B41FA5}">
+                      <a16:colId xmlns:a16="http://schemas.microsoft.com/office/drawing/2014/main" val="11159229"/>
+                    </a:ext>
+                  </a:extLst>
+                </a:gridCol>
+              </a:tblGrid>
+              <a:tr h="3156153">
+                <a:tc>
+                  <a:txBody>
+                    <a:bodyPr/>
+                    <a:lstStyle/>
+                    <a:p>
+                      <a:r>
+                        <a:rPr lang="vi-VN" dirty="0">
+                          <a:solidFill>
+                            <a:schemeClr val="tx1"/>
+                          </a:solidFill>
+                        </a:rPr>
+                        <a:t>Đây là menu chính của trang  web.</a:t>
+                      </a:r>
+                      <a:endParaRPr lang="en-US" dirty="0">
+                        <a:solidFill>
+                          <a:schemeClr val="tx1"/>
+                        </a:solidFill>
+                      </a:endParaRPr>
+                    </a:p>
+                  </a:txBody>
+                  <a:tcPr>
+                    <a:noFill/>
+                  </a:tcPr>
+                </a:tc>
+                <a:extLst>
+                  <a:ext uri="{0D108BD9-81ED-4DB2-BD59-A6C34878D82A}">
+                    <a16:rowId xmlns:a16="http://schemas.microsoft.com/office/drawing/2014/main" val="3036277137"/>
+                  </a:ext>
+                </a:extLst>
+              </a:tr>
+            </a:tbl>
+          </a:graphicData>
+        </a:graphic>
+      </p:graphicFrame>
     </p:spTree>
     <p:extLst>
       <p:ext uri="{BB962C8B-B14F-4D97-AF65-F5344CB8AC3E}">
@@ -3505,291 +4928,13 @@
   <p:clrMapOvr>
     <a:masterClrMapping/>
   </p:clrMapOvr>
-  <mc:AlternateContent xmlns:mc="http://schemas.openxmlformats.org/markup-compatibility/2006">
-    <mc:Choice xmlns:p159="http://schemas.microsoft.com/office/powerpoint/2015/09/main" Requires="p159">
+  <mc:AlternateContent xmlns:mc="http://schemas.openxmlformats.org/markup-compatibility/2006" xmlns:p159="http://schemas.microsoft.com/office/powerpoint/2015/09/main">
+    <mc:Choice Requires="p159">
       <p:transition xmlns:p14="http://schemas.microsoft.com/office/powerpoint/2010/main" spd="slow" p14:dur="2000">
         <p159:morph option="byObject"/>
       </p:transition>
     </mc:Choice>
-    <mc:Fallback>
-      <p:transition spd="slow">
-        <p:fade/>
-      </p:transition>
-    </mc:Fallback>
-  </mc:AlternateContent>
-  <p:timing>
-    <p:tnLst>
-      <p:par>
-        <p:cTn id="1" dur="indefinite" restart="never" nodeType="tmRoot">
-          <p:childTnLst>
-            <p:seq concurrent="1" nextAc="seek">
-              <p:cTn id="2" dur="indefinite" nodeType="mainSeq">
-                <p:childTnLst>
-                  <p:par>
-                    <p:cTn id="3" fill="hold">
-                      <p:stCondLst>
-                        <p:cond delay="indefinite"/>
-                      </p:stCondLst>
-                      <p:childTnLst>
-                        <p:par>
-                          <p:cTn id="4" fill="hold">
-                            <p:stCondLst>
-                              <p:cond delay="0"/>
-                            </p:stCondLst>
-                            <p:childTnLst>
-                              <p:par>
-                                <p:cTn id="5" presetID="1" presetClass="entr" presetSubtype="0" fill="hold" nodeType="clickEffect">
-                                  <p:stCondLst>
-                                    <p:cond delay="0"/>
-                                  </p:stCondLst>
-                                  <p:childTnLst>
-                                    <p:set>
-                                      <p:cBhvr>
-                                        <p:cTn id="6" dur="1" fill="hold">
-                                          <p:stCondLst>
-                                            <p:cond delay="0"/>
-                                          </p:stCondLst>
-                                        </p:cTn>
-                                        <p:tgtEl>
-                                          <p:spTgt spid="5"/>
-                                        </p:tgtEl>
-                                        <p:attrNameLst>
-                                          <p:attrName>style.visibility</p:attrName>
-                                        </p:attrNameLst>
-                                      </p:cBhvr>
-                                      <p:to>
-                                        <p:strVal val="visible"/>
-                                      </p:to>
-                                    </p:set>
-                                  </p:childTnLst>
-                                </p:cTn>
-                              </p:par>
-                            </p:childTnLst>
-                          </p:cTn>
-                        </p:par>
-                      </p:childTnLst>
-                    </p:cTn>
-                  </p:par>
-                </p:childTnLst>
-              </p:cTn>
-              <p:prevCondLst>
-                <p:cond evt="onPrev" delay="0">
-                  <p:tgtEl>
-                    <p:sldTgt/>
-                  </p:tgtEl>
-                </p:cond>
-              </p:prevCondLst>
-              <p:nextCondLst>
-                <p:cond evt="onNext" delay="0">
-                  <p:tgtEl>
-                    <p:sldTgt/>
-                  </p:tgtEl>
-                </p:cond>
-              </p:nextCondLst>
-            </p:seq>
-          </p:childTnLst>
-        </p:cTn>
-      </p:par>
-    </p:tnLst>
-  </p:timing>
-</p:sld>
-</file>
-
-<file path=ppt/slides/slide10.xml><?xml version="1.0" encoding="utf-8"?>
-<p:sld xmlns:a="http://schemas.openxmlformats.org/drawingml/2006/main" xmlns:r="http://schemas.openxmlformats.org/officeDocument/2006/relationships" xmlns:p="http://schemas.openxmlformats.org/presentationml/2006/main">
-  <p:cSld>
-    <p:spTree>
-      <p:nvGrpSpPr>
-        <p:cNvPr id="1" name=""/>
-        <p:cNvGrpSpPr/>
-        <p:nvPr/>
-      </p:nvGrpSpPr>
-      <p:grpSpPr>
-        <a:xfrm>
-          <a:off x="0" y="0"/>
-          <a:ext cx="0" cy="0"/>
-          <a:chOff x="0" y="0"/>
-          <a:chExt cx="0" cy="0"/>
-        </a:xfrm>
-      </p:grpSpPr>
-      <p:sp>
-        <p:nvSpPr>
-          <p:cNvPr id="2" name="Title 1">
-            <a:extLst>
-              <a:ext uri="{FF2B5EF4-FFF2-40B4-BE49-F238E27FC236}">
-                <a16:creationId xmlns:a16="http://schemas.microsoft.com/office/drawing/2014/main" id="{604D97C4-EB95-7C03-60A8-1F99C98BD8C6}"/>
-              </a:ext>
-            </a:extLst>
-          </p:cNvPr>
-          <p:cNvSpPr>
-            <a:spLocks noGrp="1"/>
-          </p:cNvSpPr>
-          <p:nvPr>
-            <p:ph type="title"/>
-          </p:nvPr>
-        </p:nvSpPr>
-        <p:spPr/>
-        <p:txBody>
-          <a:bodyPr/>
-          <a:lstStyle/>
-          <a:p>
-            <a:pPr marL="571500" indent="-571500">
-              <a:buFont typeface="Wingdings" panose="05000000000000000000" pitchFamily="2" charset="2"/>
-              <a:buChar char="v"/>
-            </a:pPr>
-            <a:r>
-              <a:rPr lang="vi-VN" dirty="0">
-                <a:solidFill>
-                  <a:srgbClr val="FF0000"/>
-                </a:solidFill>
-              </a:rPr>
-              <a:t>Footer là phần cuối cùng của trang web</a:t>
-            </a:r>
-            <a:br>
-              <a:rPr lang="vi-VN" dirty="0">
-                <a:solidFill>
-                  <a:srgbClr val="FF0000"/>
-                </a:solidFill>
-              </a:rPr>
-            </a:br>
-            <a:endParaRPr lang="en-US" dirty="0">
-              <a:solidFill>
-                <a:srgbClr val="FF0000"/>
-              </a:solidFill>
-            </a:endParaRPr>
-          </a:p>
-        </p:txBody>
-      </p:sp>
-      <p:pic>
-        <p:nvPicPr>
-          <p:cNvPr id="5" name="Content Placeholder 4">
-            <a:extLst>
-              <a:ext uri="{FF2B5EF4-FFF2-40B4-BE49-F238E27FC236}">
-                <a16:creationId xmlns:a16="http://schemas.microsoft.com/office/drawing/2014/main" id="{CE030FFA-D812-F7D3-A53F-CBE710BB9313}"/>
-              </a:ext>
-            </a:extLst>
-          </p:cNvPr>
-          <p:cNvPicPr>
-            <a:picLocks noGrp="1" noChangeAspect="1"/>
-          </p:cNvPicPr>
-          <p:nvPr>
-            <p:ph idx="1"/>
-          </p:nvPr>
-        </p:nvPicPr>
-        <p:blipFill>
-          <a:blip r:embed="rId2"/>
-          <a:stretch>
-            <a:fillRect/>
-          </a:stretch>
-        </p:blipFill>
-        <p:spPr>
-          <a:xfrm>
-            <a:off x="1347019" y="1690688"/>
-            <a:ext cx="8780208" cy="3776047"/>
-          </a:xfrm>
-        </p:spPr>
-      </p:pic>
-      <p:graphicFrame>
-        <p:nvGraphicFramePr>
-          <p:cNvPr id="3" name="Table 2">
-            <a:extLst>
-              <a:ext uri="{FF2B5EF4-FFF2-40B4-BE49-F238E27FC236}">
-                <a16:creationId xmlns:a16="http://schemas.microsoft.com/office/drawing/2014/main" id="{524798BB-39CB-1FBF-6741-4B2FC81969BC}"/>
-              </a:ext>
-            </a:extLst>
-          </p:cNvPr>
-          <p:cNvGraphicFramePr>
-            <a:graphicFrameLocks noGrp="1"/>
-          </p:cNvGraphicFramePr>
-          <p:nvPr>
-            <p:extLst>
-              <p:ext uri="{D42A27DB-BD31-4B8C-83A1-F6EECF244321}">
-                <p14:modId xmlns:p14="http://schemas.microsoft.com/office/powerpoint/2010/main" val="572689427"/>
-              </p:ext>
-            </p:extLst>
-          </p:nvPr>
-        </p:nvGraphicFramePr>
-        <p:xfrm>
-          <a:off x="4208206" y="4336026"/>
-          <a:ext cx="5919021" cy="1130708"/>
-        </p:xfrm>
-        <a:graphic>
-          <a:graphicData uri="http://schemas.openxmlformats.org/drawingml/2006/table">
-            <a:tbl>
-              <a:tblPr firstRow="1" bandRow="1">
-                <a:tableStyleId>{5C22544A-7EE6-4342-B048-85BDC9FD1C3A}</a:tableStyleId>
-              </a:tblPr>
-              <a:tblGrid>
-                <a:gridCol w="5919021">
-                  <a:extLst>
-                    <a:ext uri="{9D8B030D-6E8A-4147-A177-3AD203B41FA5}">
-                      <a16:colId xmlns:a16="http://schemas.microsoft.com/office/drawing/2014/main" val="641891578"/>
-                    </a:ext>
-                  </a:extLst>
-                </a:gridCol>
-              </a:tblGrid>
-              <a:tr h="1130708">
-                <a:tc>
-                  <a:txBody>
-                    <a:bodyPr/>
-                    <a:lstStyle/>
-                    <a:p>
-                      <a:pPr marL="0" marR="0" lvl="0" indent="0" algn="l" defTabSz="914400" rtl="0" eaLnBrk="1" fontAlgn="auto" latinLnBrk="0" hangingPunct="1">
-                        <a:lnSpc>
-                          <a:spcPct val="100000"/>
-                        </a:lnSpc>
-                        <a:spcBef>
-                          <a:spcPts val="0"/>
-                        </a:spcBef>
-                        <a:spcAft>
-                          <a:spcPts val="0"/>
-                        </a:spcAft>
-                        <a:buClrTx/>
-                        <a:buSzTx/>
-                        <a:buFontTx/>
-                        <a:buNone/>
-                        <a:tabLst/>
-                        <a:defRPr/>
-                      </a:pPr>
-                      <a:r>
-                        <a:rPr lang="vi-VN" dirty="0"/>
-                        <a:t>Đối với phần Footer của các trang nó ghi chú thêm địa chỉ và liên hệ, và tạo thêm chức năng truy cập.</a:t>
-                      </a:r>
-                      <a:endParaRPr lang="en-US" dirty="0"/>
-                    </a:p>
-                    <a:p>
-                      <a:endParaRPr lang="en-US" dirty="0"/>
-                    </a:p>
-                  </a:txBody>
-                  <a:tcPr/>
-                </a:tc>
-                <a:extLst>
-                  <a:ext uri="{0D108BD9-81ED-4DB2-BD59-A6C34878D82A}">
-                    <a16:rowId xmlns:a16="http://schemas.microsoft.com/office/drawing/2014/main" val="2065553542"/>
-                  </a:ext>
-                </a:extLst>
-              </a:tr>
-            </a:tbl>
-          </a:graphicData>
-        </a:graphic>
-      </p:graphicFrame>
-    </p:spTree>
-    <p:extLst>
-      <p:ext uri="{BB962C8B-B14F-4D97-AF65-F5344CB8AC3E}">
-        <p14:creationId xmlns:p14="http://schemas.microsoft.com/office/powerpoint/2010/main" val="4246578007"/>
-      </p:ext>
-    </p:extLst>
-  </p:cSld>
-  <p:clrMapOvr>
-    <a:masterClrMapping/>
-  </p:clrMapOvr>
-  <mc:AlternateContent xmlns:mc="http://schemas.openxmlformats.org/markup-compatibility/2006">
-    <mc:Choice xmlns:p14="http://schemas.microsoft.com/office/powerpoint/2010/main" Requires="p14">
-      <p:transition spd="slow" p14:dur="3400">
-        <p14:reveal/>
-      </p:transition>
-    </mc:Choice>
-    <mc:Fallback>
+    <mc:Fallback xmlns="">
       <p:transition spd="slow">
         <p:fade/>
       </p:transition>
@@ -3798,7 +4943,7 @@
 </p:sld>
 </file>
 
-<file path=ppt/slides/slide2.xml><?xml version="1.0" encoding="utf-8"?>
+<file path=ppt/slides/slide3.xml><?xml version="1.0" encoding="utf-8"?>
 <p:sld xmlns:a="http://schemas.openxmlformats.org/drawingml/2006/main" xmlns:r="http://schemas.openxmlformats.org/officeDocument/2006/relationships" xmlns:p="http://schemas.openxmlformats.org/presentationml/2006/main">
   <p:cSld>
     <p:bg>
@@ -3907,7 +5052,7 @@
         </p:spPr>
         <p:txBody>
           <a:bodyPr>
-            <a:normAutofit/>
+            <a:normAutofit lnSpcReduction="10000"/>
           </a:bodyPr>
           <a:lstStyle/>
           <a:p>
@@ -3916,13 +5061,13 @@
               <a:buChar char="v"/>
             </a:pPr>
             <a:r>
-              <a:rPr lang="vi-VN" sz="1100" dirty="0"/>
+              <a:rPr lang="vi-VN" sz="1600" dirty="0"/>
               <a:t>Dưới đây là sile nói về các chức năng chính của Trang Chủ:</a:t>
             </a:r>
           </a:p>
           <a:p>
             <a:r>
-              <a:rPr lang="vi-VN" sz="1100" dirty="0"/>
+              <a:rPr lang="vi-VN" sz="1600" dirty="0"/>
               <a:t>Các chức năng về các nút xem:youtube, facebook,intargram .</a:t>
             </a:r>
           </a:p>
@@ -3940,7 +5085,7 @@
           </a:p>
           <a:p>
             <a:r>
-              <a:rPr lang="vi-VN" sz="1100" dirty="0"/>
+              <a:rPr lang="vi-VN" sz="1600" dirty="0"/>
               <a:t>Trang Chủ còn chứa các khám phá </a:t>
             </a:r>
             <a:r>
@@ -3953,57 +5098,18 @@
           </a:p>
           <a:p>
             <a:r>
-              <a:rPr lang="vi-VN" sz="1100" dirty="0"/>
+              <a:rPr lang="vi-VN" sz="1600" dirty="0"/>
               <a:t>Khi người dùng click vào các mũi tên thông tin sẽ xuất hiện phù hợp với tựa đề.</a:t>
             </a:r>
           </a:p>
           <a:p>
             <a:r>
-              <a:rPr lang="vi-VN" sz="1100" dirty="0"/>
+              <a:rPr lang="vi-VN" sz="1600" dirty="0"/>
               <a:t>Danh mục hình ảnh sẽ hiện ra các sile hình liên tục với ba loại hình.</a:t>
             </a:r>
           </a:p>
         </p:txBody>
       </p:sp>
-      <p:pic>
-        <p:nvPicPr>
-          <p:cNvPr id="8" name="Picture 7">
-            <a:extLst>
-              <a:ext uri="{FF2B5EF4-FFF2-40B4-BE49-F238E27FC236}">
-                <a16:creationId xmlns:a16="http://schemas.microsoft.com/office/drawing/2014/main" id="{6F673179-2E94-45FA-240B-B440F943046B}"/>
-              </a:ext>
-            </a:extLst>
-          </p:cNvPr>
-          <p:cNvPicPr>
-            <a:picLocks noChangeAspect="1"/>
-          </p:cNvPicPr>
-          <p:nvPr/>
-        </p:nvPicPr>
-        <p:blipFill>
-          <a:blip r:embed="rId2"/>
-          <a:srcRect l="14275" r="9777" b="-2"/>
-          <a:stretch/>
-        </p:blipFill>
-        <p:spPr>
-          <a:xfrm>
-            <a:off x="4901268" y="-4"/>
-            <a:ext cx="7287684" cy="3694372"/>
-          </a:xfrm>
-          <a:prstGeom prst="rect">
-            <a:avLst/>
-          </a:prstGeom>
-          <a:ln>
-            <a:noFill/>
-          </a:ln>
-          <a:effectLst>
-            <a:outerShdw blurRad="292100" dist="139700" dir="2700000" algn="tl" rotWithShape="0">
-              <a:srgbClr val="333333">
-                <a:alpha val="65000"/>
-              </a:srgbClr>
-            </a:outerShdw>
-          </a:effectLst>
-        </p:spPr>
-      </p:pic>
       <p:pic>
         <p:nvPicPr>
           <p:cNvPr id="16" name="Picture 15">
@@ -4019,14 +5125,14 @@
           <p:nvPr/>
         </p:nvPicPr>
         <p:blipFill>
-          <a:blip r:embed="rId3"/>
+          <a:blip r:embed="rId2"/>
           <a:srcRect r="10641" b="2"/>
           <a:stretch/>
         </p:blipFill>
         <p:spPr>
           <a:xfrm>
-            <a:off x="4726728" y="3802961"/>
-            <a:ext cx="7472381" cy="3055043"/>
+            <a:off x="4726729" y="4050890"/>
+            <a:ext cx="7462224" cy="2807114"/>
           </a:xfrm>
           <a:prstGeom prst="rect">
             <a:avLst/>
@@ -4078,15 +5184,15 @@
           <p:nvPr/>
         </p:nvPicPr>
         <p:blipFill>
-          <a:blip r:embed="rId4"/>
+          <a:blip r:embed="rId3"/>
           <a:stretch>
             <a:fillRect/>
           </a:stretch>
         </p:blipFill>
         <p:spPr>
           <a:xfrm>
-            <a:off x="993106" y="3027525"/>
-            <a:ext cx="1457528" cy="666843"/>
+            <a:off x="1858344" y="3334451"/>
+            <a:ext cx="1457528" cy="549920"/>
           </a:xfrm>
           <a:prstGeom prst="rect">
             <a:avLst/>
@@ -4137,14 +5243,14 @@
           <p:nvPr>
             <p:extLst>
               <p:ext uri="{D42A27DB-BD31-4B8C-83A1-F6EECF244321}">
-                <p14:modId xmlns:p14="http://schemas.microsoft.com/office/powerpoint/2010/main" val="4031439712"/>
+                <p14:modId xmlns:p14="http://schemas.microsoft.com/office/powerpoint/2010/main" val="1051264117"/>
               </p:ext>
             </p:extLst>
           </p:nvPr>
         </p:nvGraphicFramePr>
         <p:xfrm>
           <a:off x="993107" y="176981"/>
-          <a:ext cx="3908162" cy="1769369"/>
+          <a:ext cx="3661190" cy="1769369"/>
         </p:xfrm>
         <a:graphic>
           <a:graphicData uri="http://schemas.openxmlformats.org/drawingml/2006/table">
@@ -4153,7 +5259,7 @@
                 <a:tableStyleId>{5C22544A-7EE6-4342-B048-85BDC9FD1C3A}</a:tableStyleId>
               </a:tblPr>
               <a:tblGrid>
-                <a:gridCol w="3908162">
+                <a:gridCol w="3661190">
                   <a:extLst>
                     <a:ext uri="{9D8B030D-6E8A-4147-A177-3AD203B41FA5}">
                       <a16:colId xmlns:a16="http://schemas.microsoft.com/office/drawing/2014/main" val="3474843419"/>
@@ -4201,6 +5307,36 @@
           <p:nvPr/>
         </p:nvPicPr>
         <p:blipFill>
+          <a:blip r:embed="rId4"/>
+          <a:stretch>
+            <a:fillRect/>
+          </a:stretch>
+        </p:blipFill>
+        <p:spPr>
+          <a:xfrm>
+            <a:off x="993105" y="936559"/>
+            <a:ext cx="3661189" cy="1009791"/>
+          </a:xfrm>
+          <a:prstGeom prst="rect">
+            <a:avLst/>
+          </a:prstGeom>
+        </p:spPr>
+      </p:pic>
+      <p:pic>
+        <p:nvPicPr>
+          <p:cNvPr id="2" name="Picture 1">
+            <a:extLst>
+              <a:ext uri="{FF2B5EF4-FFF2-40B4-BE49-F238E27FC236}">
+                <a16:creationId xmlns:a16="http://schemas.microsoft.com/office/drawing/2014/main" id="{6B72B9BD-4FA2-EE2E-2042-9A6AB8CA7C23}"/>
+              </a:ext>
+            </a:extLst>
+          </p:cNvPr>
+          <p:cNvPicPr>
+            <a:picLocks noChangeAspect="1"/>
+          </p:cNvPicPr>
+          <p:nvPr/>
+        </p:nvPicPr>
+        <p:blipFill>
           <a:blip r:embed="rId5"/>
           <a:stretch>
             <a:fillRect/>
@@ -4208,12 +5344,38 @@
         </p:blipFill>
         <p:spPr>
           <a:xfrm>
-            <a:off x="993106" y="936561"/>
-            <a:ext cx="3898005" cy="1009791"/>
+            <a:off x="4726729" y="8330"/>
+            <a:ext cx="7394169" cy="3876040"/>
           </a:xfrm>
           <a:prstGeom prst="rect">
             <a:avLst/>
           </a:prstGeom>
+          <a:ln w="190500" cap="sq">
+            <a:solidFill>
+              <a:srgbClr val="C8C6BD"/>
+            </a:solidFill>
+            <a:prstDash val="solid"/>
+            <a:miter lim="800000"/>
+          </a:ln>
+          <a:effectLst>
+            <a:outerShdw blurRad="254000" algn="bl" rotWithShape="0">
+              <a:srgbClr val="000000">
+                <a:alpha val="43000"/>
+              </a:srgbClr>
+            </a:outerShdw>
+          </a:effectLst>
+          <a:scene3d>
+            <a:camera prst="perspectiveFront" fov="5400000"/>
+            <a:lightRig rig="threePt" dir="t">
+              <a:rot lat="0" lon="0" rev="2100000"/>
+            </a:lightRig>
+          </a:scene3d>
+          <a:sp3d extrusionH="25400">
+            <a:bevelT w="304800" h="152400" prst="hardEdge"/>
+            <a:extrusionClr>
+              <a:srgbClr val="000000"/>
+            </a:extrusionClr>
+          </a:sp3d>
         </p:spPr>
       </p:pic>
     </p:spTree>
@@ -4226,13 +5388,13 @@
   <p:clrMapOvr>
     <a:masterClrMapping/>
   </p:clrMapOvr>
-  <mc:AlternateContent xmlns:mc="http://schemas.openxmlformats.org/markup-compatibility/2006">
-    <mc:Choice xmlns:p14="http://schemas.microsoft.com/office/powerpoint/2010/main" Requires="p14">
+  <mc:AlternateContent xmlns:mc="http://schemas.openxmlformats.org/markup-compatibility/2006" xmlns:p14="http://schemas.microsoft.com/office/powerpoint/2010/main">
+    <mc:Choice Requires="p14">
       <p:transition spd="med" p14:dur="700">
         <p:fade/>
       </p:transition>
     </mc:Choice>
-    <mc:Fallback>
+    <mc:Fallback xmlns="">
       <p:transition spd="med">
         <p:fade/>
       </p:transition>
@@ -4241,7 +5403,7 @@
 </p:sld>
 </file>
 
-<file path=ppt/slides/slide3.xml><?xml version="1.0" encoding="utf-8"?>
+<file path=ppt/slides/slide4.xml><?xml version="1.0" encoding="utf-8"?>
 <p:sld xmlns:a="http://schemas.openxmlformats.org/drawingml/2006/main" xmlns:r="http://schemas.openxmlformats.org/officeDocument/2006/relationships" xmlns:p="http://schemas.openxmlformats.org/presentationml/2006/main">
   <p:cSld>
     <p:bg>
@@ -14790,45 +15952,6 @@
           </p:sp>
         </p:grpSp>
       </p:grpSp>
-      <p:sp>
-        <p:nvSpPr>
-          <p:cNvPr id="2" name="Title 1">
-            <a:extLst>
-              <a:ext uri="{FF2B5EF4-FFF2-40B4-BE49-F238E27FC236}">
-                <a16:creationId xmlns:a16="http://schemas.microsoft.com/office/drawing/2014/main" id="{72694458-2F55-C345-728A-A3ED5E022B27}"/>
-              </a:ext>
-            </a:extLst>
-          </p:cNvPr>
-          <p:cNvSpPr>
-            <a:spLocks noGrp="1"/>
-          </p:cNvSpPr>
-          <p:nvPr>
-            <p:ph type="title"/>
-          </p:nvPr>
-        </p:nvSpPr>
-        <p:spPr>
-          <a:xfrm>
-            <a:off x="130630" y="150724"/>
-            <a:ext cx="6139542" cy="6556549"/>
-          </a:xfrm>
-        </p:spPr>
-        <p:txBody>
-          <a:bodyPr vert="horz" lIns="91440" tIns="45720" rIns="91440" bIns="45720" rtlCol="0" anchor="b">
-            <a:normAutofit/>
-          </a:bodyPr>
-          <a:lstStyle/>
-          <a:p>
-            <a:endParaRPr lang="en-US" sz="7200" kern="1200" dirty="0">
-              <a:solidFill>
-                <a:schemeClr val="bg1"/>
-              </a:solidFill>
-              <a:latin typeface="+mj-lt"/>
-              <a:ea typeface="+mj-ea"/>
-              <a:cs typeface="+mj-cs"/>
-            </a:endParaRPr>
-          </a:p>
-        </p:txBody>
-      </p:sp>
       <p:pic>
         <p:nvPicPr>
           <p:cNvPr id="5" name="Picture 4">
@@ -14874,7 +15997,7 @@
           <p:nvPr>
             <p:extLst>
               <p:ext uri="{D42A27DB-BD31-4B8C-83A1-F6EECF244321}">
-                <p14:modId xmlns:p14="http://schemas.microsoft.com/office/powerpoint/2010/main" val="2358986593"/>
+                <p14:modId xmlns:p14="http://schemas.microsoft.com/office/powerpoint/2010/main" val="2741201643"/>
               </p:ext>
             </p:extLst>
           </p:nvPr>
@@ -14910,12 +16033,14 @@
                       </a:pPr>
                       <a:r>
                         <a:rPr lang="vi-VN" b="0" dirty="0"/>
-                        <a:t>Bên trong có video nói về khái quát về Di Tích Tỉnh Trà Vinh. Kèm với đó là lời cảm ơn trân trọng nhất với những người đã ghé vào xem website.</a:t>
+                        <a:t>Bên trong trang chủ có video nói về khái quát về Di Tích Tỉnh Trà Vinh. Kèm với đó là lời cảm ơn trân trọng nhất với những người đã ghé vào xem website.</a:t>
                       </a:r>
                       <a:endParaRPr lang="en-US" b="0" dirty="0"/>
                     </a:p>
                   </a:txBody>
-                  <a:tcPr/>
+                  <a:tcPr>
+                    <a:noFill/>
+                  </a:tcPr>
                 </a:tc>
                 <a:extLst>
                   <a:ext uri="{0D108BD9-81ED-4DB2-BD59-A6C34878D82A}">
@@ -14942,14 +16067,14 @@
           <p:nvPr>
             <p:extLst>
               <p:ext uri="{D42A27DB-BD31-4B8C-83A1-F6EECF244321}">
-                <p14:modId xmlns:p14="http://schemas.microsoft.com/office/powerpoint/2010/main" val="1843866203"/>
+                <p14:modId xmlns:p14="http://schemas.microsoft.com/office/powerpoint/2010/main" val="1468418600"/>
               </p:ext>
             </p:extLst>
           </p:nvPr>
         </p:nvGraphicFramePr>
         <p:xfrm>
-          <a:off x="3549444" y="154817"/>
-          <a:ext cx="2720181" cy="6556548"/>
+          <a:off x="3619235" y="150723"/>
+          <a:ext cx="2660696" cy="6552455"/>
         </p:xfrm>
         <a:graphic>
           <a:graphicData uri="http://schemas.openxmlformats.org/drawingml/2006/table">
@@ -14958,7 +16083,7 @@
                 <a:tableStyleId>{5C22544A-7EE6-4342-B048-85BDC9FD1C3A}</a:tableStyleId>
               </a:tblPr>
               <a:tblGrid>
-                <a:gridCol w="2720181">
+                <a:gridCol w="2660696">
                   <a:extLst>
                     <a:ext uri="{9D8B030D-6E8A-4147-A177-3AD203B41FA5}">
                       <a16:colId xmlns:a16="http://schemas.microsoft.com/office/drawing/2014/main" val="3982377649"/>
@@ -14966,7 +16091,7 @@
                   </a:extLst>
                 </a:gridCol>
               </a:tblGrid>
-              <a:tr h="6556548">
+              <a:tr h="6552455">
                 <a:tc>
                   <a:txBody>
                     <a:bodyPr/>
@@ -14978,7 +16103,7 @@
                       </a:pPr>
                       <a:r>
                         <a:rPr lang="vi-VN" dirty="0"/>
-                        <a:t>Đối với chức năng tiếp cận thông tin giúp cho du khách biết  được các thông tin hữu ích về sử phát triênmr của Gtinhr Trà Vinh.</a:t>
+                        <a:t>Đối với chức năng tiếp cận thông tin giúp cho du khách biết  được các thông tin hữu ích về sử phát triển của Tỉnh Trà Vinh.</a:t>
                       </a:r>
                     </a:p>
                     <a:p>
@@ -14992,9 +16117,22 @@
                       </a:r>
                     </a:p>
                     <a:p>
-                      <a:pPr marL="285750" indent="-285750">
+                      <a:pPr marL="285750" marR="0" lvl="0" indent="-285750" algn="l" defTabSz="914400" rtl="0" eaLnBrk="1" fontAlgn="auto" latinLnBrk="0" hangingPunct="1">
+                        <a:lnSpc>
+                          <a:spcPct val="100000"/>
+                        </a:lnSpc>
+                        <a:spcBef>
+                          <a:spcPts val="0"/>
+                        </a:spcBef>
+                        <a:spcAft>
+                          <a:spcPts val="0"/>
+                        </a:spcAft>
+                        <a:buClrTx/>
+                        <a:buSzTx/>
                         <a:buFont typeface="Wingdings" panose="05000000000000000000" pitchFamily="2" charset="2"/>
                         <a:buChar char="v"/>
+                        <a:tabLst/>
+                        <a:defRPr/>
                       </a:pPr>
                       <a:r>
                         <a:rPr lang="vi-VN" dirty="0"/>
@@ -15002,8 +16140,17 @@
                       </a:r>
                       <a:endParaRPr lang="en-US" dirty="0"/>
                     </a:p>
+                    <a:p>
+                      <a:pPr marL="0" indent="0">
+                        <a:buFont typeface="Wingdings" panose="05000000000000000000" pitchFamily="2" charset="2"/>
+                        <a:buNone/>
+                      </a:pPr>
+                      <a:endParaRPr lang="vi-VN" dirty="0"/>
+                    </a:p>
                   </a:txBody>
-                  <a:tcPr/>
+                  <a:tcPr>
+                    <a:noFill/>
+                  </a:tcPr>
                 </a:tc>
                 <a:extLst>
                   <a:ext uri="{0D108BD9-81ED-4DB2-BD59-A6C34878D82A}">
@@ -15038,7 +16185,7 @@
         <p:spPr>
           <a:xfrm>
             <a:off x="140388" y="154817"/>
-            <a:ext cx="3408509" cy="6552456"/>
+            <a:ext cx="3408509" cy="6548361"/>
           </a:xfrm>
           <a:prstGeom prst="rect">
             <a:avLst/>
@@ -15061,7 +16208,7 @@
 </p:sld>
 </file>
 
-<file path=ppt/slides/slide4.xml><?xml version="1.0" encoding="utf-8"?>
+<file path=ppt/slides/slide5.xml><?xml version="1.0" encoding="utf-8"?>
 <p:sld xmlns:a="http://schemas.openxmlformats.org/drawingml/2006/main" xmlns:r="http://schemas.openxmlformats.org/officeDocument/2006/relationships" xmlns:p="http://schemas.openxmlformats.org/presentationml/2006/main">
   <p:cSld>
     <p:bg>
@@ -15167,8 +16314,8 @@
         </p:blipFill>
         <p:spPr>
           <a:xfrm>
-            <a:off x="2529254" y="10"/>
-            <a:ext cx="9669642" cy="6857990"/>
+            <a:off x="4109774" y="10"/>
+            <a:ext cx="8089121" cy="6857990"/>
           </a:xfrm>
           <a:prstGeom prst="rect">
             <a:avLst/>
@@ -15325,8 +16472,8 @@
         </p:blipFill>
         <p:spPr>
           <a:xfrm>
-            <a:off x="362201" y="2412556"/>
-            <a:ext cx="3747575" cy="1278567"/>
+            <a:off x="838200" y="2412556"/>
+            <a:ext cx="3271576" cy="1278567"/>
           </a:xfrm>
         </p:spPr>
       </p:pic>
@@ -15345,14 +16492,14 @@
           <p:nvPr>
             <p:extLst>
               <p:ext uri="{D42A27DB-BD31-4B8C-83A1-F6EECF244321}">
-                <p14:modId xmlns:p14="http://schemas.microsoft.com/office/powerpoint/2010/main" val="2281201804"/>
+                <p14:modId xmlns:p14="http://schemas.microsoft.com/office/powerpoint/2010/main" val="3812230278"/>
               </p:ext>
             </p:extLst>
           </p:nvPr>
         </p:nvGraphicFramePr>
         <p:xfrm>
-          <a:off x="362201" y="3665595"/>
-          <a:ext cx="3747574" cy="2922018"/>
+          <a:off x="838199" y="3665595"/>
+          <a:ext cx="3271576" cy="2922018"/>
         </p:xfrm>
         <a:graphic>
           <a:graphicData uri="http://schemas.openxmlformats.org/drawingml/2006/table">
@@ -15361,7 +16508,7 @@
                 <a:tableStyleId>{5C22544A-7EE6-4342-B048-85BDC9FD1C3A}</a:tableStyleId>
               </a:tblPr>
               <a:tblGrid>
-                <a:gridCol w="3747574">
+                <a:gridCol w="3271576">
                   <a:extLst>
                     <a:ext uri="{9D8B030D-6E8A-4147-A177-3AD203B41FA5}">
                       <a16:colId xmlns:a16="http://schemas.microsoft.com/office/drawing/2014/main" val="2458859225"/>
@@ -15380,13 +16527,23 @@
                         <a:buChar char="v"/>
                       </a:pPr>
                       <a:r>
-                        <a:rPr lang="vi-VN" dirty="0"/>
+                        <a:rPr lang="vi-VN" dirty="0">
+                          <a:solidFill>
+                            <a:schemeClr val="tx1"/>
+                          </a:solidFill>
+                        </a:rPr>
                         <a:t>Chức năng chính trong trang  web Giới Thiệu là Tổng Hợp có bao nhiêu di tích thuộc cấp tỉnh và cấp quốc gia, điểm nổi bậc về lịch sử. Khi ta click vào nút xem chi tiết web sẽ đưa người đọc đến giao diện di tích.</a:t>
                       </a:r>
-                      <a:endParaRPr lang="en-US" dirty="0"/>
+                      <a:endParaRPr lang="en-US" dirty="0">
+                        <a:solidFill>
+                          <a:schemeClr val="tx1"/>
+                        </a:solidFill>
+                      </a:endParaRPr>
                     </a:p>
                   </a:txBody>
-                  <a:tcPr/>
+                  <a:tcPr>
+                    <a:noFill/>
+                  </a:tcPr>
                 </a:tc>
                 <a:extLst>
                   <a:ext uri="{0D108BD9-81ED-4DB2-BD59-A6C34878D82A}">
@@ -15408,13 +16565,13 @@
   <p:clrMapOvr>
     <a:masterClrMapping/>
   </p:clrMapOvr>
-  <mc:AlternateContent xmlns:mc="http://schemas.openxmlformats.org/markup-compatibility/2006">
-    <mc:Choice xmlns:p14="http://schemas.microsoft.com/office/powerpoint/2010/main" Requires="p14">
+  <mc:AlternateContent xmlns:mc="http://schemas.openxmlformats.org/markup-compatibility/2006" xmlns:p14="http://schemas.microsoft.com/office/powerpoint/2010/main">
+    <mc:Choice Requires="p14">
       <p:transition spd="slow" p14:dur="1500">
         <p:split orient="vert"/>
       </p:transition>
     </mc:Choice>
-    <mc:Fallback>
+    <mc:Fallback xmlns="">
       <p:transition spd="slow">
         <p:split orient="vert"/>
       </p:transition>
@@ -15423,7 +16580,7 @@
 </p:sld>
 </file>
 
-<file path=ppt/slides/slide5.xml><?xml version="1.0" encoding="utf-8"?>
+<file path=ppt/slides/slide6.xml><?xml version="1.0" encoding="utf-8"?>
 <p:sld xmlns:a="http://schemas.openxmlformats.org/drawingml/2006/main" xmlns:r="http://schemas.openxmlformats.org/officeDocument/2006/relationships" xmlns:p="http://schemas.openxmlformats.org/presentationml/2006/main">
   <p:cSld>
     <p:spTree>
@@ -15512,7 +16669,7 @@
         </p:spPr>
         <p:txBody>
           <a:bodyPr>
-            <a:normAutofit fontScale="92500" lnSpcReduction="10000"/>
+            <a:normAutofit/>
           </a:bodyPr>
           <a:lstStyle/>
           <a:p>
@@ -15551,25 +16708,7 @@
           <a:p>
             <a:r>
               <a:rPr lang="vi-VN" sz="2000" dirty="0"/>
-              <a:t>Tìm kiếm giúp du khách dễ </a:t>
-            </a:r>
-          </a:p>
-          <a:p>
-            <a:pPr marL="0" indent="0">
-              <a:buNone/>
-            </a:pPr>
-            <a:r>
-              <a:rPr lang="vi-VN" sz="2000" dirty="0"/>
-              <a:t>dàng tìm kiếm. Tìm kiếm theo</a:t>
-            </a:r>
-          </a:p>
-          <a:p>
-            <a:pPr marL="0" indent="0">
-              <a:buNone/>
-            </a:pPr>
-            <a:r>
-              <a:rPr lang="vi-VN" sz="2000" dirty="0"/>
-              <a:t> tên theo địa điểm.</a:t>
+              <a:t>Tìm kiếm giúp du khách dễ dàng tìm kiếm. Tìm kiếm theo tên theo địa điểm.</a:t>
             </a:r>
           </a:p>
           <a:p>
@@ -15722,7 +16861,7 @@
         </p:blipFill>
         <p:spPr>
           <a:xfrm>
-            <a:off x="4132012" y="3864076"/>
+            <a:off x="4092685" y="3885685"/>
             <a:ext cx="3527317" cy="2529196"/>
           </a:xfrm>
           <a:prstGeom prst="rect">
@@ -15745,7 +16884,7 @@
           <p:nvPr>
             <p:extLst>
               <p:ext uri="{D42A27DB-BD31-4B8C-83A1-F6EECF244321}">
-                <p14:modId xmlns:p14="http://schemas.microsoft.com/office/powerpoint/2010/main" val="4205016582"/>
+                <p14:modId xmlns:p14="http://schemas.microsoft.com/office/powerpoint/2010/main" val="3874462093"/>
               </p:ext>
             </p:extLst>
           </p:nvPr>
@@ -15780,7 +16919,11 @@
                         <a:buChar char="•"/>
                       </a:pPr>
                       <a:r>
-                        <a:rPr lang="vi-VN" sz="1600" dirty="0"/>
+                        <a:rPr lang="vi-VN" sz="1600" dirty="0">
+                          <a:solidFill>
+                            <a:schemeClr val="tx1"/>
+                          </a:solidFill>
+                        </a:rPr>
                         <a:t>Giới thiệu sơ lượt về nét riêng của di tích. Các di tích cong có nút xem chi tiết, trong đây sẽ nói rõ hơn và còn có chức năng chỉ đường và đặc lịch tham quan. Chỉ đường giúp cho người dùng biết rõ các di chuyển. Và chức năng đặt lịch tham quan gúp cho người dùng đặc lịch tham quan đến di tích, đối với chức năng này cả 2 trang Quốc Gia và cấp Tỉnh đã hoàn thành việc lưu trữ để admin vào xem.</a:t>
                       </a:r>
                     </a:p>
@@ -15792,7 +16935,9 @@
                       <a:endParaRPr lang="en-US" dirty="0"/>
                     </a:p>
                   </a:txBody>
-                  <a:tcPr/>
+                  <a:tcPr>
+                    <a:noFill/>
+                  </a:tcPr>
                 </a:tc>
                 <a:extLst>
                   <a:ext uri="{0D108BD9-81ED-4DB2-BD59-A6C34878D82A}">
@@ -15826,8 +16971,8 @@
         </p:blipFill>
         <p:spPr>
           <a:xfrm>
-            <a:off x="7725693" y="3864076"/>
-            <a:ext cx="4166417" cy="2529195"/>
+            <a:off x="7725693" y="3637935"/>
+            <a:ext cx="4166417" cy="2755337"/>
           </a:xfrm>
           <a:prstGeom prst="rect">
             <a:avLst/>
@@ -15874,13 +17019,13 @@
   <p:clrMapOvr>
     <a:masterClrMapping/>
   </p:clrMapOvr>
-  <mc:AlternateContent xmlns:mc="http://schemas.openxmlformats.org/markup-compatibility/2006">
-    <mc:Choice xmlns:p14="http://schemas.microsoft.com/office/powerpoint/2010/main" Requires="p14">
+  <mc:AlternateContent xmlns:mc="http://schemas.openxmlformats.org/markup-compatibility/2006" xmlns:p14="http://schemas.microsoft.com/office/powerpoint/2010/main">
+    <mc:Choice Requires="p14">
       <p:transition spd="slow" p14:dur="3400">
         <p14:reveal/>
       </p:transition>
     </mc:Choice>
-    <mc:Fallback>
+    <mc:Fallback xmlns="">
       <p:transition spd="slow">
         <p:fade/>
       </p:transition>
@@ -15889,7 +17034,7 @@
 </p:sld>
 </file>
 
-<file path=ppt/slides/slide6.xml><?xml version="1.0" encoding="utf-8"?>
+<file path=ppt/slides/slide7.xml><?xml version="1.0" encoding="utf-8"?>
 <p:sld xmlns:a="http://schemas.openxmlformats.org/drawingml/2006/main" xmlns:r="http://schemas.openxmlformats.org/officeDocument/2006/relationships" xmlns:p="http://schemas.openxmlformats.org/presentationml/2006/main">
   <p:cSld>
     <p:spTree>
@@ -15970,8 +17115,8 @@
         </p:blipFill>
         <p:spPr>
           <a:xfrm>
-            <a:off x="858557" y="4237702"/>
-            <a:ext cx="1432360" cy="2113935"/>
+            <a:off x="858557" y="4502187"/>
+            <a:ext cx="1432360" cy="1849450"/>
           </a:xfrm>
         </p:spPr>
       </p:pic>
@@ -15997,8 +17142,8 @@
         </p:blipFill>
         <p:spPr>
           <a:xfrm>
-            <a:off x="2317421" y="4237693"/>
-            <a:ext cx="1409005" cy="2113937"/>
+            <a:off x="2290917" y="4502180"/>
+            <a:ext cx="1409005" cy="1849450"/>
           </a:xfrm>
           <a:prstGeom prst="rect">
             <a:avLst/>
@@ -16027,7 +17172,7 @@
         </p:blipFill>
         <p:spPr>
           <a:xfrm>
-            <a:off x="3787810" y="2934758"/>
+            <a:off x="3838495" y="3103838"/>
             <a:ext cx="2669000" cy="2113934"/>
           </a:xfrm>
           <a:prstGeom prst="rect">
@@ -16058,7 +17203,7 @@
         <p:spPr>
           <a:xfrm>
             <a:off x="832053" y="2458064"/>
-            <a:ext cx="2894373" cy="1779635"/>
+            <a:ext cx="2894373" cy="2044116"/>
           </a:xfrm>
           <a:prstGeom prst="rect">
             <a:avLst/>
@@ -16080,7 +17225,7 @@
           <p:nvPr>
             <p:extLst>
               <p:ext uri="{D42A27DB-BD31-4B8C-83A1-F6EECF244321}">
-                <p14:modId xmlns:p14="http://schemas.microsoft.com/office/powerpoint/2010/main" val="3526280972"/>
+                <p14:modId xmlns:p14="http://schemas.microsoft.com/office/powerpoint/2010/main" val="3250523064"/>
               </p:ext>
             </p:extLst>
           </p:nvPr>
@@ -16115,13 +17260,23 @@
                         <a:buChar char="•"/>
                       </a:pPr>
                       <a:r>
-                        <a:rPr lang="vi-VN" dirty="0"/>
+                        <a:rPr lang="vi-VN" dirty="0">
+                          <a:solidFill>
+                            <a:schemeClr val="tx1"/>
+                          </a:solidFill>
+                        </a:rPr>
                         <a:t>Trong trang di tích cấp Tỉnh còn có thêm chức năng phản hồi du khách</a:t>
                       </a:r>
-                      <a:endParaRPr lang="en-US" dirty="0"/>
+                      <a:endParaRPr lang="en-US" dirty="0">
+                        <a:solidFill>
+                          <a:schemeClr val="tx1"/>
+                        </a:solidFill>
+                      </a:endParaRPr>
                     </a:p>
                   </a:txBody>
-                  <a:tcPr/>
+                  <a:tcPr>
+                    <a:noFill/>
+                  </a:tcPr>
                 </a:tc>
                 <a:extLst>
                   <a:ext uri="{0D108BD9-81ED-4DB2-BD59-A6C34878D82A}">
@@ -16246,7 +17401,7 @@
           <p:nvPr>
             <p:extLst>
               <p:ext uri="{D42A27DB-BD31-4B8C-83A1-F6EECF244321}">
-                <p14:modId xmlns:p14="http://schemas.microsoft.com/office/powerpoint/2010/main" val="3795761466"/>
+                <p14:modId xmlns:p14="http://schemas.microsoft.com/office/powerpoint/2010/main" val="1409438310"/>
               </p:ext>
             </p:extLst>
           </p:nvPr>
@@ -16278,14 +17433,23 @@
                     <a:p>
                       <a:r>
                         <a:rPr lang="vi-VN" dirty="0">
+                          <a:solidFill>
+                            <a:schemeClr val="tx1"/>
+                          </a:solidFill>
                           <a:sym typeface="Wingdings" panose="05000000000000000000" pitchFamily="2" charset="2"/>
                         </a:rPr>
                         <a:t>Các thông tin giúp cho du khách biết rõ các di tích về các di tích thuộc cấp quốc gia.</a:t>
                       </a:r>
-                      <a:endParaRPr lang="en-US" dirty="0"/>
+                      <a:endParaRPr lang="en-US" dirty="0">
+                        <a:solidFill>
+                          <a:schemeClr val="tx1"/>
+                        </a:solidFill>
+                      </a:endParaRPr>
                     </a:p>
                   </a:txBody>
-                  <a:tcPr/>
+                  <a:tcPr>
+                    <a:noFill/>
+                  </a:tcPr>
                 </a:tc>
                 <a:extLst>
                   <a:ext uri="{0D108BD9-81ED-4DB2-BD59-A6C34878D82A}">
@@ -16349,7 +17513,7 @@
         </p:blipFill>
         <p:spPr>
           <a:xfrm>
-            <a:off x="9311148" y="1577738"/>
+            <a:off x="9298861" y="1451398"/>
             <a:ext cx="2893139" cy="2659955"/>
           </a:xfrm>
           <a:prstGeom prst="rect">
@@ -16403,7 +17567,7 @@
 </p:sld>
 </file>
 
-<file path=ppt/slides/slide7.xml><?xml version="1.0" encoding="utf-8"?>
+<file path=ppt/slides/slide8.xml><?xml version="1.0" encoding="utf-8"?>
 <p:sld xmlns:a="http://schemas.openxmlformats.org/drawingml/2006/main" xmlns:r="http://schemas.openxmlformats.org/officeDocument/2006/relationships" xmlns:p="http://schemas.openxmlformats.org/presentationml/2006/main">
   <p:cSld>
     <p:spTree>
@@ -16510,7 +17674,7 @@
           <p:nvPr>
             <p:extLst>
               <p:ext uri="{D42A27DB-BD31-4B8C-83A1-F6EECF244321}">
-                <p14:modId xmlns:p14="http://schemas.microsoft.com/office/powerpoint/2010/main" val="317298664"/>
+                <p14:modId xmlns:p14="http://schemas.microsoft.com/office/powerpoint/2010/main" val="1080718848"/>
               </p:ext>
             </p:extLst>
           </p:nvPr>
@@ -16545,13 +17709,23 @@
                         <a:buChar char="•"/>
                       </a:pPr>
                       <a:r>
-                        <a:rPr lang="vi-VN" sz="1400" dirty="0"/>
+                        <a:rPr lang="vi-VN" sz="1400" dirty="0">
+                          <a:solidFill>
+                            <a:schemeClr val="tx1"/>
+                          </a:solidFill>
+                        </a:rPr>
                         <a:t>Trang Du lịch có tạo thêm chức năng về các đặt tour Văn Hóa Khmer, tour sinh thái cồn hồ, và đặt xe du lịch. Các chức năng này đã hoàn thành lưu trữ để Admin xem lại.</a:t>
                       </a:r>
-                      <a:endParaRPr lang="en-US" sz="1400" dirty="0"/>
+                      <a:endParaRPr lang="en-US" sz="1400" dirty="0">
+                        <a:solidFill>
+                          <a:schemeClr val="tx1"/>
+                        </a:solidFill>
+                      </a:endParaRPr>
                     </a:p>
                   </a:txBody>
-                  <a:tcPr/>
+                  <a:tcPr>
+                    <a:noFill/>
+                  </a:tcPr>
                 </a:tc>
                 <a:extLst>
                   <a:ext uri="{0D108BD9-81ED-4DB2-BD59-A6C34878D82A}">
@@ -16668,7 +17842,7 @@
           <p:nvPr>
             <p:extLst>
               <p:ext uri="{D42A27DB-BD31-4B8C-83A1-F6EECF244321}">
-                <p14:modId xmlns:p14="http://schemas.microsoft.com/office/powerpoint/2010/main" val="63432989"/>
+                <p14:modId xmlns:p14="http://schemas.microsoft.com/office/powerpoint/2010/main" val="2653712159"/>
               </p:ext>
             </p:extLst>
           </p:nvPr>
@@ -16703,13 +17877,23 @@
                         <a:buChar char="•"/>
                       </a:pPr>
                       <a:r>
-                        <a:rPr lang="vi-VN" dirty="0"/>
+                        <a:rPr lang="vi-VN" dirty="0">
+                          <a:solidFill>
+                            <a:schemeClr val="tx1"/>
+                          </a:solidFill>
+                        </a:rPr>
                         <a:t>Thông tin du lịch hữu ích: nói chi tiết về thời điểm du lịch lý tưởng, phương tiện di chuyển, lưu trú và ẩm thực, lễ hội, mua sắm và quà lưu niệm, an toàn và sức khỏe. </a:t>
                       </a:r>
-                      <a:endParaRPr lang="en-US" dirty="0"/>
+                      <a:endParaRPr lang="en-US" dirty="0">
+                        <a:solidFill>
+                          <a:schemeClr val="tx1"/>
+                        </a:solidFill>
+                      </a:endParaRPr>
                     </a:p>
                   </a:txBody>
-                  <a:tcPr/>
+                  <a:tcPr>
+                    <a:noFill/>
+                  </a:tcPr>
                 </a:tc>
                 <a:extLst>
                   <a:ext uri="{0D108BD9-81ED-4DB2-BD59-A6C34878D82A}">
@@ -16821,13 +18005,13 @@
   <p:clrMapOvr>
     <a:masterClrMapping/>
   </p:clrMapOvr>
-  <mc:AlternateContent xmlns:mc="http://schemas.openxmlformats.org/markup-compatibility/2006">
-    <mc:Choice xmlns:p14="http://schemas.microsoft.com/office/powerpoint/2010/main" Requires="p14">
+  <mc:AlternateContent xmlns:mc="http://schemas.openxmlformats.org/markup-compatibility/2006" xmlns:p14="http://schemas.microsoft.com/office/powerpoint/2010/main">
+    <mc:Choice Requires="p14">
       <p:transition spd="slow" p14:dur="800">
         <p:circle/>
       </p:transition>
     </mc:Choice>
-    <mc:Fallback>
+    <mc:Fallback xmlns="">
       <p:transition spd="slow">
         <p:circle/>
       </p:transition>
@@ -16836,7 +18020,7 @@
 </p:sld>
 </file>
 
-<file path=ppt/slides/slide8.xml><?xml version="1.0" encoding="utf-8"?>
+<file path=ppt/slides/slide9.xml><?xml version="1.0" encoding="utf-8"?>
 <p:sld xmlns:a="http://schemas.openxmlformats.org/drawingml/2006/main" xmlns:r="http://schemas.openxmlformats.org/officeDocument/2006/relationships" xmlns:p="http://schemas.openxmlformats.org/presentationml/2006/main">
   <p:cSld>
     <p:spTree>
@@ -16980,7 +18164,7 @@
           <p:nvPr>
             <p:extLst>
               <p:ext uri="{D42A27DB-BD31-4B8C-83A1-F6EECF244321}">
-                <p14:modId xmlns:p14="http://schemas.microsoft.com/office/powerpoint/2010/main" val="1585292027"/>
+                <p14:modId xmlns:p14="http://schemas.microsoft.com/office/powerpoint/2010/main" val="1486481014"/>
               </p:ext>
             </p:extLst>
           </p:nvPr>
@@ -17011,13 +18195,23 @@
                     <a:lstStyle/>
                     <a:p>
                       <a:r>
-                        <a:rPr lang="vi-VN" dirty="0"/>
+                        <a:rPr lang="vi-VN" dirty="0">
+                          <a:solidFill>
+                            <a:schemeClr val="tx1"/>
+                          </a:solidFill>
+                        </a:rPr>
                         <a:t>+ Trong trang còn liên kết với các đường link nói về các thời kỳ (cổ đại đến tk17)(tk17-18)(1867-1954)(1945 đến nay)  khi click vào các nút trang web sẽ đưa người đọc đén trang web khác giới thiệu chi tiết về chúng. Khi click vào danh mục di tích và văn hóa đặc sắc cũng hiện lên trang web khác giới thiệu các di tích.</a:t>
                       </a:r>
-                      <a:endParaRPr lang="en-US" dirty="0"/>
+                      <a:endParaRPr lang="en-US" dirty="0">
+                        <a:solidFill>
+                          <a:schemeClr val="tx1"/>
+                        </a:solidFill>
+                      </a:endParaRPr>
                     </a:p>
                   </a:txBody>
-                  <a:tcPr/>
+                  <a:tcPr>
+                    <a:noFill/>
+                  </a:tcPr>
                 </a:tc>
                 <a:extLst>
                   <a:ext uri="{0D108BD9-81ED-4DB2-BD59-A6C34878D82A}">
@@ -17044,7 +18238,7 @@
           <p:nvPr>
             <p:extLst>
               <p:ext uri="{D42A27DB-BD31-4B8C-83A1-F6EECF244321}">
-                <p14:modId xmlns:p14="http://schemas.microsoft.com/office/powerpoint/2010/main" val="653349227"/>
+                <p14:modId xmlns:p14="http://schemas.microsoft.com/office/powerpoint/2010/main" val="3264750068"/>
               </p:ext>
             </p:extLst>
           </p:nvPr>
@@ -17079,13 +18273,23 @@
                         <a:buChar char="•"/>
                       </a:pPr>
                       <a:r>
-                        <a:rPr lang="vi-VN" dirty="0"/>
+                        <a:rPr lang="vi-VN" dirty="0">
+                          <a:solidFill>
+                            <a:schemeClr val="tx1"/>
+                          </a:solidFill>
+                        </a:rPr>
                         <a:t>Trang này nói về các nội dung chính của Lịch qua các thời kỳ. Và nói về các nét đặc sắc của  các di tích và nét văn hóa.</a:t>
                       </a:r>
-                      <a:endParaRPr lang="en-US" dirty="0"/>
+                      <a:endParaRPr lang="en-US" dirty="0">
+                        <a:solidFill>
+                          <a:schemeClr val="tx1"/>
+                        </a:solidFill>
+                      </a:endParaRPr>
                     </a:p>
                   </a:txBody>
-                  <a:tcPr/>
+                  <a:tcPr>
+                    <a:noFill/>
+                  </a:tcPr>
                 </a:tc>
                 <a:extLst>
                   <a:ext uri="{0D108BD9-81ED-4DB2-BD59-A6C34878D82A}">
@@ -17109,348 +18313,6 @@
   </p:clrMapOvr>
   <p:transition spd="med">
     <p:pull/>
-  </p:transition>
-</p:sld>
-</file>
-
-<file path=ppt/slides/slide9.xml><?xml version="1.0" encoding="utf-8"?>
-<p:sld xmlns:a="http://schemas.openxmlformats.org/drawingml/2006/main" xmlns:r="http://schemas.openxmlformats.org/officeDocument/2006/relationships" xmlns:p="http://schemas.openxmlformats.org/presentationml/2006/main">
-  <p:cSld>
-    <p:spTree>
-      <p:nvGrpSpPr>
-        <p:cNvPr id="1" name=""/>
-        <p:cNvGrpSpPr/>
-        <p:nvPr/>
-      </p:nvGrpSpPr>
-      <p:grpSpPr>
-        <a:xfrm>
-          <a:off x="0" y="0"/>
-          <a:ext cx="0" cy="0"/>
-          <a:chOff x="0" y="0"/>
-          <a:chExt cx="0" cy="0"/>
-        </a:xfrm>
-      </p:grpSpPr>
-      <p:sp>
-        <p:nvSpPr>
-          <p:cNvPr id="2" name="Title 1">
-            <a:extLst>
-              <a:ext uri="{FF2B5EF4-FFF2-40B4-BE49-F238E27FC236}">
-                <a16:creationId xmlns:a16="http://schemas.microsoft.com/office/drawing/2014/main" id="{C23A2193-10E1-3B17-D2F1-FD19DE8CC1FD}"/>
-              </a:ext>
-            </a:extLst>
-          </p:cNvPr>
-          <p:cNvSpPr>
-            <a:spLocks noGrp="1"/>
-          </p:cNvSpPr>
-          <p:nvPr>
-            <p:ph type="title"/>
-          </p:nvPr>
-        </p:nvSpPr>
-        <p:spPr>
-          <a:xfrm>
-            <a:off x="838200" y="511277"/>
-            <a:ext cx="1973826" cy="5665686"/>
-          </a:xfrm>
-        </p:spPr>
-        <p:txBody>
-          <a:bodyPr/>
-          <a:lstStyle/>
-          <a:p>
-            <a:pPr marL="571500" indent="-571500">
-              <a:buFont typeface="Wingdings" panose="05000000000000000000" pitchFamily="2" charset="2"/>
-              <a:buChar char="v"/>
-            </a:pPr>
-            <a:r>
-              <a:rPr lang="vi-VN" dirty="0">
-                <a:solidFill>
-                  <a:srgbClr val="FF0000"/>
-                </a:solidFill>
-              </a:rPr>
-              <a:t>Về trang liên hệ.</a:t>
-            </a:r>
-            <a:endParaRPr lang="en-US" dirty="0">
-              <a:solidFill>
-                <a:srgbClr val="FF0000"/>
-              </a:solidFill>
-            </a:endParaRPr>
-          </a:p>
-        </p:txBody>
-      </p:sp>
-      <p:sp>
-        <p:nvSpPr>
-          <p:cNvPr id="3" name="Content Placeholder 2">
-            <a:extLst>
-              <a:ext uri="{FF2B5EF4-FFF2-40B4-BE49-F238E27FC236}">
-                <a16:creationId xmlns:a16="http://schemas.microsoft.com/office/drawing/2014/main" id="{6BC6F12E-E7E1-C106-7975-ADCF121BCDAE}"/>
-              </a:ext>
-            </a:extLst>
-          </p:cNvPr>
-          <p:cNvSpPr>
-            <a:spLocks noGrp="1"/>
-          </p:cNvSpPr>
-          <p:nvPr>
-            <p:ph idx="1"/>
-          </p:nvPr>
-        </p:nvSpPr>
-        <p:spPr>
-          <a:xfrm>
-            <a:off x="2812027" y="511277"/>
-            <a:ext cx="8541773" cy="5665686"/>
-          </a:xfrm>
-        </p:spPr>
-        <p:txBody>
-          <a:bodyPr/>
-          <a:lstStyle/>
-          <a:p>
-            <a:r>
-              <a:rPr lang="vi-VN" dirty="0"/>
-              <a:t>Liên hệ đã đưa ra thông tin về cách liên hệ đến admin người tạo ra trang web.</a:t>
-            </a:r>
-          </a:p>
-          <a:p>
-            <a:pPr marL="0" indent="0">
-              <a:buNone/>
-            </a:pPr>
-            <a:endParaRPr lang="en-US" dirty="0"/>
-          </a:p>
-        </p:txBody>
-      </p:sp>
-      <p:pic>
-        <p:nvPicPr>
-          <p:cNvPr id="5" name="Picture 4">
-            <a:extLst>
-              <a:ext uri="{FF2B5EF4-FFF2-40B4-BE49-F238E27FC236}">
-                <a16:creationId xmlns:a16="http://schemas.microsoft.com/office/drawing/2014/main" id="{E73C1AD9-DBDD-5217-AB9B-8017BA40D750}"/>
-              </a:ext>
-            </a:extLst>
-          </p:cNvPr>
-          <p:cNvPicPr>
-            <a:picLocks noChangeAspect="1"/>
-          </p:cNvPicPr>
-          <p:nvPr/>
-        </p:nvPicPr>
-        <p:blipFill>
-          <a:blip r:embed="rId2"/>
-          <a:stretch>
-            <a:fillRect/>
-          </a:stretch>
-        </p:blipFill>
-        <p:spPr>
-          <a:xfrm>
-            <a:off x="3098521" y="1431832"/>
-            <a:ext cx="2648734" cy="4398696"/>
-          </a:xfrm>
-          <a:prstGeom prst="rect">
-            <a:avLst/>
-          </a:prstGeom>
-        </p:spPr>
-      </p:pic>
-      <p:graphicFrame>
-        <p:nvGraphicFramePr>
-          <p:cNvPr id="6" name="Table 5">
-            <a:extLst>
-              <a:ext uri="{FF2B5EF4-FFF2-40B4-BE49-F238E27FC236}">
-                <a16:creationId xmlns:a16="http://schemas.microsoft.com/office/drawing/2014/main" id="{52D47687-C0DA-5CFE-0961-A0B25E088D5E}"/>
-              </a:ext>
-            </a:extLst>
-          </p:cNvPr>
-          <p:cNvGraphicFramePr>
-            <a:graphicFrameLocks noGrp="1"/>
-          </p:cNvGraphicFramePr>
-          <p:nvPr>
-            <p:extLst>
-              <p:ext uri="{D42A27DB-BD31-4B8C-83A1-F6EECF244321}">
-                <p14:modId xmlns:p14="http://schemas.microsoft.com/office/powerpoint/2010/main" val="926684177"/>
-              </p:ext>
-            </p:extLst>
-          </p:nvPr>
-        </p:nvGraphicFramePr>
-        <p:xfrm>
-          <a:off x="5747256" y="1431832"/>
-          <a:ext cx="4832254" cy="4398696"/>
-        </p:xfrm>
-        <a:graphic>
-          <a:graphicData uri="http://schemas.openxmlformats.org/drawingml/2006/table">
-            <a:tbl>
-              <a:tblPr firstRow="1" bandRow="1">
-                <a:tableStyleId>{5C22544A-7EE6-4342-B048-85BDC9FD1C3A}</a:tableStyleId>
-              </a:tblPr>
-              <a:tblGrid>
-                <a:gridCol w="4832254">
-                  <a:extLst>
-                    <a:ext uri="{9D8B030D-6E8A-4147-A177-3AD203B41FA5}">
-                      <a16:colId xmlns:a16="http://schemas.microsoft.com/office/drawing/2014/main" val="2679755447"/>
-                    </a:ext>
-                  </a:extLst>
-                </a:gridCol>
-              </a:tblGrid>
-              <a:tr h="4398696">
-                <a:tc>
-                  <a:txBody>
-                    <a:bodyPr/>
-                    <a:lstStyle/>
-                    <a:p>
-                      <a:pPr marL="285750" indent="-285750">
-                        <a:buFont typeface="Wingdings" panose="05000000000000000000" pitchFamily="2" charset="2"/>
-                        <a:buChar char="v"/>
-                      </a:pPr>
-                      <a:r>
-                        <a:rPr lang="vi-VN" dirty="0"/>
-                        <a:t>Chức năng chính trong trang này là chức năng gửi tin nhắn phản hồi của du khác, mọi góp ý phản hồi đều được ghi nhận lại.</a:t>
-                      </a:r>
-                    </a:p>
-                    <a:p>
-                      <a:pPr marL="285750" indent="-285750">
-                        <a:buFont typeface="Wingdings" panose="05000000000000000000" pitchFamily="2" charset="2"/>
-                        <a:buChar char="v"/>
-                      </a:pPr>
-                      <a:endParaRPr lang="vi-VN" dirty="0"/>
-                    </a:p>
-                    <a:p>
-                      <a:pPr marL="285750" indent="-285750">
-                        <a:buFont typeface="Wingdings" panose="05000000000000000000" pitchFamily="2" charset="2"/>
-                        <a:buChar char="v"/>
-                      </a:pPr>
-                      <a:endParaRPr lang="vi-VN" dirty="0"/>
-                    </a:p>
-                    <a:p>
-                      <a:pPr marL="285750" indent="-285750">
-                        <a:buFont typeface="Wingdings" panose="05000000000000000000" pitchFamily="2" charset="2"/>
-                        <a:buChar char="v"/>
-                      </a:pPr>
-                      <a:endParaRPr lang="vi-VN" dirty="0"/>
-                    </a:p>
-                    <a:p>
-                      <a:pPr marL="285750" indent="-285750">
-                        <a:buFont typeface="Wingdings" panose="05000000000000000000" pitchFamily="2" charset="2"/>
-                        <a:buChar char="v"/>
-                      </a:pPr>
-                      <a:endParaRPr lang="vi-VN" dirty="0"/>
-                    </a:p>
-                    <a:p>
-                      <a:pPr marL="285750" indent="-285750">
-                        <a:buFont typeface="Wingdings" panose="05000000000000000000" pitchFamily="2" charset="2"/>
-                        <a:buChar char="v"/>
-                      </a:pPr>
-                      <a:endParaRPr lang="vi-VN" dirty="0"/>
-                    </a:p>
-                    <a:p>
-                      <a:pPr marL="285750" indent="-285750">
-                        <a:buFont typeface="Wingdings" panose="05000000000000000000" pitchFamily="2" charset="2"/>
-                        <a:buChar char="v"/>
-                      </a:pPr>
-                      <a:endParaRPr lang="vi-VN" dirty="0"/>
-                    </a:p>
-                    <a:p>
-                      <a:pPr marL="285750" indent="-285750">
-                        <a:buFont typeface="Wingdings" panose="05000000000000000000" pitchFamily="2" charset="2"/>
-                        <a:buChar char="v"/>
-                      </a:pPr>
-                      <a:endParaRPr lang="vi-VN" dirty="0"/>
-                    </a:p>
-                    <a:p>
-                      <a:pPr marL="285750" indent="-285750">
-                        <a:buFont typeface="Wingdings" panose="05000000000000000000" pitchFamily="2" charset="2"/>
-                        <a:buChar char="v"/>
-                      </a:pPr>
-                      <a:endParaRPr lang="vi-VN" dirty="0"/>
-                    </a:p>
-                    <a:p>
-                      <a:pPr marL="285750" indent="-285750">
-                        <a:buFont typeface="Arial" panose="020B0604020202020204" pitchFamily="34" charset="0"/>
-                        <a:buChar char="•"/>
-                      </a:pPr>
-                      <a:r>
-                        <a:rPr lang="vi-VN" dirty="0"/>
-                        <a:t>Các phản hồi của người đọc về trang web sẽ được ghi nhận lại để cãi thiện.</a:t>
-                      </a:r>
-                      <a:endParaRPr lang="en-US" dirty="0"/>
-                    </a:p>
-                  </a:txBody>
-                  <a:tcPr/>
-                </a:tc>
-                <a:extLst>
-                  <a:ext uri="{0D108BD9-81ED-4DB2-BD59-A6C34878D82A}">
-                    <a16:rowId xmlns:a16="http://schemas.microsoft.com/office/drawing/2014/main" val="277963379"/>
-                  </a:ext>
-                </a:extLst>
-              </a:tr>
-            </a:tbl>
-          </a:graphicData>
-        </a:graphic>
-      </p:graphicFrame>
-      <p:pic>
-        <p:nvPicPr>
-          <p:cNvPr id="8" name="Picture 7">
-            <a:extLst>
-              <a:ext uri="{FF2B5EF4-FFF2-40B4-BE49-F238E27FC236}">
-                <a16:creationId xmlns:a16="http://schemas.microsoft.com/office/drawing/2014/main" id="{03695B80-E42B-EF12-C776-E1EB25E5EAFF}"/>
-              </a:ext>
-            </a:extLst>
-          </p:cNvPr>
-          <p:cNvPicPr>
-            <a:picLocks noChangeAspect="1"/>
-          </p:cNvPicPr>
-          <p:nvPr/>
-        </p:nvPicPr>
-        <p:blipFill>
-          <a:blip r:embed="rId3"/>
-          <a:stretch>
-            <a:fillRect/>
-          </a:stretch>
-        </p:blipFill>
-        <p:spPr>
-          <a:xfrm>
-            <a:off x="5747255" y="2598794"/>
-            <a:ext cx="4832254" cy="2012535"/>
-          </a:xfrm>
-          <a:prstGeom prst="rect">
-            <a:avLst/>
-          </a:prstGeom>
-        </p:spPr>
-      </p:pic>
-      <p:pic>
-        <p:nvPicPr>
-          <p:cNvPr id="7" name="Picture 6">
-            <a:extLst>
-              <a:ext uri="{FF2B5EF4-FFF2-40B4-BE49-F238E27FC236}">
-                <a16:creationId xmlns:a16="http://schemas.microsoft.com/office/drawing/2014/main" id="{E3CEBBE8-7E30-3F52-757A-E4FC61F4F5D7}"/>
-              </a:ext>
-            </a:extLst>
-          </p:cNvPr>
-          <p:cNvPicPr>
-            <a:picLocks noChangeAspect="1"/>
-          </p:cNvPicPr>
-          <p:nvPr/>
-        </p:nvPicPr>
-        <p:blipFill>
-          <a:blip r:embed="rId4"/>
-          <a:stretch>
-            <a:fillRect/>
-          </a:stretch>
-        </p:blipFill>
-        <p:spPr>
-          <a:xfrm>
-            <a:off x="5747254" y="3588774"/>
-            <a:ext cx="902511" cy="1022555"/>
-          </a:xfrm>
-          <a:prstGeom prst="rect">
-            <a:avLst/>
-          </a:prstGeom>
-        </p:spPr>
-      </p:pic>
-    </p:spTree>
-    <p:extLst>
-      <p:ext uri="{BB962C8B-B14F-4D97-AF65-F5344CB8AC3E}">
-        <p14:creationId xmlns:p14="http://schemas.microsoft.com/office/powerpoint/2010/main" val="796407206"/>
-      </p:ext>
-    </p:extLst>
-  </p:cSld>
-  <p:clrMapOvr>
-    <a:masterClrMapping/>
-  </p:clrMapOvr>
-  <p:transition spd="slow">
-    <p:cover/>
   </p:transition>
 </p:sld>
 </file>

</xml_diff>